<commit_message>
Add .gitignore entry for cred.env file
</commit_message>
<xml_diff>
--- a/krish sharma hackerzstreet2.0.pptx
+++ b/krish sharma hackerzstreet2.0.pptx
@@ -4,8 +4,22 @@
   <p:sldMasterIdLst>
     <p:sldMasterId id="2147483648" r:id="rId1"/>
   </p:sldMasterIdLst>
+  <p:notesMasterIdLst>
+    <p:notesMasterId r:id="rId14"/>
+  </p:notesMasterIdLst>
   <p:sldIdLst>
     <p:sldId id="256" r:id="rId2"/>
+    <p:sldId id="257" r:id="rId3"/>
+    <p:sldId id="263" r:id="rId4"/>
+    <p:sldId id="264" r:id="rId5"/>
+    <p:sldId id="259" r:id="rId6"/>
+    <p:sldId id="261" r:id="rId7"/>
+    <p:sldId id="265" r:id="rId8"/>
+    <p:sldId id="266" r:id="rId9"/>
+    <p:sldId id="267" r:id="rId10"/>
+    <p:sldId id="268" r:id="rId11"/>
+    <p:sldId id="262" r:id="rId12"/>
+    <p:sldId id="260" r:id="rId13"/>
   </p:sldIdLst>
   <p:sldSz cx="12192000" cy="6858000"/>
   <p:notesSz cx="6858000" cy="9144000"/>
@@ -104,7 +118,1042 @@
       </a:defRPr>
     </a:lvl9pPr>
   </p:defaultTextStyle>
+  <p:extLst>
+    <p:ext uri="{EFAFB233-063F-42B5-8137-9DF3F51BA10A}">
+      <p15:sldGuideLst xmlns:p15="http://schemas.microsoft.com/office/powerpoint/2012/main"/>
+    </p:ext>
+  </p:extLst>
 </p:presentation>
+</file>
+
+<file path=ppt/notesMasters/notesMaster1.xml><?xml version="1.0" encoding="utf-8"?>
+<p:notesMaster xmlns:a="http://schemas.openxmlformats.org/drawingml/2006/main" xmlns:r="http://schemas.openxmlformats.org/officeDocument/2006/relationships" xmlns:p="http://schemas.openxmlformats.org/presentationml/2006/main">
+  <p:cSld>
+    <p:bg>
+      <p:bgRef idx="1001">
+        <a:schemeClr val="bg1"/>
+      </p:bgRef>
+    </p:bg>
+    <p:spTree>
+      <p:nvGrpSpPr>
+        <p:cNvPr id="1" name=""/>
+        <p:cNvGrpSpPr/>
+        <p:nvPr/>
+      </p:nvGrpSpPr>
+      <p:grpSpPr>
+        <a:xfrm>
+          <a:off x="0" y="0"/>
+          <a:ext cx="0" cy="0"/>
+          <a:chOff x="0" y="0"/>
+          <a:chExt cx="0" cy="0"/>
+        </a:xfrm>
+      </p:grpSpPr>
+      <p:sp>
+        <p:nvSpPr>
+          <p:cNvPr id="2" name="Header Placeholder 1"/>
+          <p:cNvSpPr>
+            <a:spLocks noGrp="1"/>
+          </p:cNvSpPr>
+          <p:nvPr>
+            <p:ph type="hdr" sz="quarter"/>
+          </p:nvPr>
+        </p:nvSpPr>
+        <p:spPr>
+          <a:xfrm>
+            <a:off x="0" y="0"/>
+            <a:ext cx="2971800" cy="458788"/>
+          </a:xfrm>
+          <a:prstGeom prst="rect">
+            <a:avLst/>
+          </a:prstGeom>
+        </p:spPr>
+        <p:txBody>
+          <a:bodyPr vert="horz" lIns="91440" tIns="45720" rIns="91440" bIns="45720" rtlCol="0"/>
+          <a:lstStyle>
+            <a:lvl1pPr algn="l">
+              <a:defRPr sz="1200"/>
+            </a:lvl1pPr>
+          </a:lstStyle>
+          <a:p>
+            <a:endParaRPr lang="en-IN"/>
+          </a:p>
+        </p:txBody>
+      </p:sp>
+      <p:sp>
+        <p:nvSpPr>
+          <p:cNvPr id="3" name="Date Placeholder 2"/>
+          <p:cNvSpPr>
+            <a:spLocks noGrp="1"/>
+          </p:cNvSpPr>
+          <p:nvPr>
+            <p:ph type="dt" idx="1"/>
+          </p:nvPr>
+        </p:nvSpPr>
+        <p:spPr>
+          <a:xfrm>
+            <a:off x="3884613" y="0"/>
+            <a:ext cx="2971800" cy="458788"/>
+          </a:xfrm>
+          <a:prstGeom prst="rect">
+            <a:avLst/>
+          </a:prstGeom>
+        </p:spPr>
+        <p:txBody>
+          <a:bodyPr vert="horz" lIns="91440" tIns="45720" rIns="91440" bIns="45720" rtlCol="0"/>
+          <a:lstStyle>
+            <a:lvl1pPr algn="r">
+              <a:defRPr sz="1200"/>
+            </a:lvl1pPr>
+          </a:lstStyle>
+          <a:p>
+            <a:fld id="{AD6594BD-9E22-4663-82F9-35E1D263E462}" type="datetimeFigureOut">
+              <a:rPr lang="en-IN" smtClean="0"/>
+              <a:t>06-04-2024</a:t>
+            </a:fld>
+            <a:endParaRPr lang="en-IN"/>
+          </a:p>
+        </p:txBody>
+      </p:sp>
+      <p:sp>
+        <p:nvSpPr>
+          <p:cNvPr id="4" name="Slide Image Placeholder 3"/>
+          <p:cNvSpPr>
+            <a:spLocks noGrp="1" noRot="1" noChangeAspect="1"/>
+          </p:cNvSpPr>
+          <p:nvPr>
+            <p:ph type="sldImg" idx="2"/>
+          </p:nvPr>
+        </p:nvSpPr>
+        <p:spPr>
+          <a:xfrm>
+            <a:off x="685800" y="1143000"/>
+            <a:ext cx="5486400" cy="3086100"/>
+          </a:xfrm>
+          <a:prstGeom prst="rect">
+            <a:avLst/>
+          </a:prstGeom>
+          <a:noFill/>
+          <a:ln w="12700">
+            <a:solidFill>
+              <a:prstClr val="black"/>
+            </a:solidFill>
+          </a:ln>
+        </p:spPr>
+        <p:txBody>
+          <a:bodyPr vert="horz" lIns="91440" tIns="45720" rIns="91440" bIns="45720" rtlCol="0" anchor="ctr"/>
+          <a:lstStyle/>
+          <a:p>
+            <a:endParaRPr lang="en-IN"/>
+          </a:p>
+        </p:txBody>
+      </p:sp>
+      <p:sp>
+        <p:nvSpPr>
+          <p:cNvPr id="5" name="Notes Placeholder 4"/>
+          <p:cNvSpPr>
+            <a:spLocks noGrp="1"/>
+          </p:cNvSpPr>
+          <p:nvPr>
+            <p:ph type="body" sz="quarter" idx="3"/>
+          </p:nvPr>
+        </p:nvSpPr>
+        <p:spPr>
+          <a:xfrm>
+            <a:off x="685800" y="4400550"/>
+            <a:ext cx="5486400" cy="3600450"/>
+          </a:xfrm>
+          <a:prstGeom prst="rect">
+            <a:avLst/>
+          </a:prstGeom>
+        </p:spPr>
+        <p:txBody>
+          <a:bodyPr vert="horz" lIns="91440" tIns="45720" rIns="91440" bIns="45720" rtlCol="0"/>
+          <a:lstStyle/>
+          <a:p>
+            <a:pPr lvl="0"/>
+            <a:r>
+              <a:rPr lang="en-US"/>
+              <a:t>Click to edit Master text styles</a:t>
+            </a:r>
+          </a:p>
+          <a:p>
+            <a:pPr lvl="1"/>
+            <a:r>
+              <a:rPr lang="en-US"/>
+              <a:t>Second level</a:t>
+            </a:r>
+          </a:p>
+          <a:p>
+            <a:pPr lvl="2"/>
+            <a:r>
+              <a:rPr lang="en-US"/>
+              <a:t>Third level</a:t>
+            </a:r>
+          </a:p>
+          <a:p>
+            <a:pPr lvl="3"/>
+            <a:r>
+              <a:rPr lang="en-US"/>
+              <a:t>Fourth level</a:t>
+            </a:r>
+          </a:p>
+          <a:p>
+            <a:pPr lvl="4"/>
+            <a:r>
+              <a:rPr lang="en-US"/>
+              <a:t>Fifth level</a:t>
+            </a:r>
+            <a:endParaRPr lang="en-IN"/>
+          </a:p>
+        </p:txBody>
+      </p:sp>
+      <p:sp>
+        <p:nvSpPr>
+          <p:cNvPr id="6" name="Footer Placeholder 5"/>
+          <p:cNvSpPr>
+            <a:spLocks noGrp="1"/>
+          </p:cNvSpPr>
+          <p:nvPr>
+            <p:ph type="ftr" sz="quarter" idx="4"/>
+          </p:nvPr>
+        </p:nvSpPr>
+        <p:spPr>
+          <a:xfrm>
+            <a:off x="0" y="8685213"/>
+            <a:ext cx="2971800" cy="458787"/>
+          </a:xfrm>
+          <a:prstGeom prst="rect">
+            <a:avLst/>
+          </a:prstGeom>
+        </p:spPr>
+        <p:txBody>
+          <a:bodyPr vert="horz" lIns="91440" tIns="45720" rIns="91440" bIns="45720" rtlCol="0" anchor="b"/>
+          <a:lstStyle>
+            <a:lvl1pPr algn="l">
+              <a:defRPr sz="1200"/>
+            </a:lvl1pPr>
+          </a:lstStyle>
+          <a:p>
+            <a:endParaRPr lang="en-IN"/>
+          </a:p>
+        </p:txBody>
+      </p:sp>
+      <p:sp>
+        <p:nvSpPr>
+          <p:cNvPr id="7" name="Slide Number Placeholder 6"/>
+          <p:cNvSpPr>
+            <a:spLocks noGrp="1"/>
+          </p:cNvSpPr>
+          <p:nvPr>
+            <p:ph type="sldNum" sz="quarter" idx="5"/>
+          </p:nvPr>
+        </p:nvSpPr>
+        <p:spPr>
+          <a:xfrm>
+            <a:off x="3884613" y="8685213"/>
+            <a:ext cx="2971800" cy="458787"/>
+          </a:xfrm>
+          <a:prstGeom prst="rect">
+            <a:avLst/>
+          </a:prstGeom>
+        </p:spPr>
+        <p:txBody>
+          <a:bodyPr vert="horz" lIns="91440" tIns="45720" rIns="91440" bIns="45720" rtlCol="0" anchor="b"/>
+          <a:lstStyle>
+            <a:lvl1pPr algn="r">
+              <a:defRPr sz="1200"/>
+            </a:lvl1pPr>
+          </a:lstStyle>
+          <a:p>
+            <a:fld id="{4025A6EF-7D2A-4597-A4A6-A9C8038BAFDF}" type="slidenum">
+              <a:rPr lang="en-IN" smtClean="0"/>
+              <a:t>‹#›</a:t>
+            </a:fld>
+            <a:endParaRPr lang="en-IN"/>
+          </a:p>
+        </p:txBody>
+      </p:sp>
+    </p:spTree>
+    <p:extLst>
+      <p:ext uri="{BB962C8B-B14F-4D97-AF65-F5344CB8AC3E}">
+        <p14:creationId xmlns:p14="http://schemas.microsoft.com/office/powerpoint/2010/main" val="701852128"/>
+      </p:ext>
+    </p:extLst>
+  </p:cSld>
+  <p:clrMap bg1="lt1" tx1="dk1" bg2="lt2" tx2="dk2" accent1="accent1" accent2="accent2" accent3="accent3" accent4="accent4" accent5="accent5" accent6="accent6" hlink="hlink" folHlink="folHlink"/>
+  <p:notesStyle>
+    <a:lvl1pPr marL="0" algn="l" defTabSz="914400" rtl="0" eaLnBrk="1" latinLnBrk="0" hangingPunct="1">
+      <a:defRPr sz="1200" kern="1200">
+        <a:solidFill>
+          <a:schemeClr val="tx1"/>
+        </a:solidFill>
+        <a:latin typeface="+mn-lt"/>
+        <a:ea typeface="+mn-ea"/>
+        <a:cs typeface="+mn-cs"/>
+      </a:defRPr>
+    </a:lvl1pPr>
+    <a:lvl2pPr marL="457200" algn="l" defTabSz="914400" rtl="0" eaLnBrk="1" latinLnBrk="0" hangingPunct="1">
+      <a:defRPr sz="1200" kern="1200">
+        <a:solidFill>
+          <a:schemeClr val="tx1"/>
+        </a:solidFill>
+        <a:latin typeface="+mn-lt"/>
+        <a:ea typeface="+mn-ea"/>
+        <a:cs typeface="+mn-cs"/>
+      </a:defRPr>
+    </a:lvl2pPr>
+    <a:lvl3pPr marL="914400" algn="l" defTabSz="914400" rtl="0" eaLnBrk="1" latinLnBrk="0" hangingPunct="1">
+      <a:defRPr sz="1200" kern="1200">
+        <a:solidFill>
+          <a:schemeClr val="tx1"/>
+        </a:solidFill>
+        <a:latin typeface="+mn-lt"/>
+        <a:ea typeface="+mn-ea"/>
+        <a:cs typeface="+mn-cs"/>
+      </a:defRPr>
+    </a:lvl3pPr>
+    <a:lvl4pPr marL="1371600" algn="l" defTabSz="914400" rtl="0" eaLnBrk="1" latinLnBrk="0" hangingPunct="1">
+      <a:defRPr sz="1200" kern="1200">
+        <a:solidFill>
+          <a:schemeClr val="tx1"/>
+        </a:solidFill>
+        <a:latin typeface="+mn-lt"/>
+        <a:ea typeface="+mn-ea"/>
+        <a:cs typeface="+mn-cs"/>
+      </a:defRPr>
+    </a:lvl4pPr>
+    <a:lvl5pPr marL="1828800" algn="l" defTabSz="914400" rtl="0" eaLnBrk="1" latinLnBrk="0" hangingPunct="1">
+      <a:defRPr sz="1200" kern="1200">
+        <a:solidFill>
+          <a:schemeClr val="tx1"/>
+        </a:solidFill>
+        <a:latin typeface="+mn-lt"/>
+        <a:ea typeface="+mn-ea"/>
+        <a:cs typeface="+mn-cs"/>
+      </a:defRPr>
+    </a:lvl5pPr>
+    <a:lvl6pPr marL="2286000" algn="l" defTabSz="914400" rtl="0" eaLnBrk="1" latinLnBrk="0" hangingPunct="1">
+      <a:defRPr sz="1200" kern="1200">
+        <a:solidFill>
+          <a:schemeClr val="tx1"/>
+        </a:solidFill>
+        <a:latin typeface="+mn-lt"/>
+        <a:ea typeface="+mn-ea"/>
+        <a:cs typeface="+mn-cs"/>
+      </a:defRPr>
+    </a:lvl6pPr>
+    <a:lvl7pPr marL="2743200" algn="l" defTabSz="914400" rtl="0" eaLnBrk="1" latinLnBrk="0" hangingPunct="1">
+      <a:defRPr sz="1200" kern="1200">
+        <a:solidFill>
+          <a:schemeClr val="tx1"/>
+        </a:solidFill>
+        <a:latin typeface="+mn-lt"/>
+        <a:ea typeface="+mn-ea"/>
+        <a:cs typeface="+mn-cs"/>
+      </a:defRPr>
+    </a:lvl7pPr>
+    <a:lvl8pPr marL="3200400" algn="l" defTabSz="914400" rtl="0" eaLnBrk="1" latinLnBrk="0" hangingPunct="1">
+      <a:defRPr sz="1200" kern="1200">
+        <a:solidFill>
+          <a:schemeClr val="tx1"/>
+        </a:solidFill>
+        <a:latin typeface="+mn-lt"/>
+        <a:ea typeface="+mn-ea"/>
+        <a:cs typeface="+mn-cs"/>
+      </a:defRPr>
+    </a:lvl8pPr>
+    <a:lvl9pPr marL="3657600" algn="l" defTabSz="914400" rtl="0" eaLnBrk="1" latinLnBrk="0" hangingPunct="1">
+      <a:defRPr sz="1200" kern="1200">
+        <a:solidFill>
+          <a:schemeClr val="tx1"/>
+        </a:solidFill>
+        <a:latin typeface="+mn-lt"/>
+        <a:ea typeface="+mn-ea"/>
+        <a:cs typeface="+mn-cs"/>
+      </a:defRPr>
+    </a:lvl9pPr>
+  </p:notesStyle>
+</p:notesMaster>
+</file>
+
+<file path=ppt/notesSlides/notesSlide1.xml><?xml version="1.0" encoding="utf-8"?>
+<p:notes xmlns:a="http://schemas.openxmlformats.org/drawingml/2006/main" xmlns:r="http://schemas.openxmlformats.org/officeDocument/2006/relationships" xmlns:p="http://schemas.openxmlformats.org/presentationml/2006/main">
+  <p:cSld>
+    <p:spTree>
+      <p:nvGrpSpPr>
+        <p:cNvPr id="1" name=""/>
+        <p:cNvGrpSpPr/>
+        <p:nvPr/>
+      </p:nvGrpSpPr>
+      <p:grpSpPr>
+        <a:xfrm>
+          <a:off x="0" y="0"/>
+          <a:ext cx="0" cy="0"/>
+          <a:chOff x="0" y="0"/>
+          <a:chExt cx="0" cy="0"/>
+        </a:xfrm>
+      </p:grpSpPr>
+      <p:sp>
+        <p:nvSpPr>
+          <p:cNvPr id="2" name="Slide Image Placeholder 1"/>
+          <p:cNvSpPr>
+            <a:spLocks noGrp="1" noRot="1" noChangeAspect="1"/>
+          </p:cNvSpPr>
+          <p:nvPr>
+            <p:ph type="sldImg"/>
+          </p:nvPr>
+        </p:nvSpPr>
+        <p:spPr/>
+      </p:sp>
+      <p:sp>
+        <p:nvSpPr>
+          <p:cNvPr id="3" name="Notes Placeholder 2"/>
+          <p:cNvSpPr>
+            <a:spLocks noGrp="1"/>
+          </p:cNvSpPr>
+          <p:nvPr>
+            <p:ph type="body" idx="1"/>
+          </p:nvPr>
+        </p:nvSpPr>
+        <p:spPr/>
+        <p:txBody>
+          <a:bodyPr/>
+          <a:lstStyle/>
+          <a:p>
+            <a:endParaRPr lang="en-IN" dirty="0"/>
+          </a:p>
+        </p:txBody>
+      </p:sp>
+      <p:sp>
+        <p:nvSpPr>
+          <p:cNvPr id="4" name="Slide Number Placeholder 3"/>
+          <p:cNvSpPr>
+            <a:spLocks noGrp="1"/>
+          </p:cNvSpPr>
+          <p:nvPr>
+            <p:ph type="sldNum" sz="quarter" idx="5"/>
+          </p:nvPr>
+        </p:nvSpPr>
+        <p:spPr/>
+        <p:txBody>
+          <a:bodyPr/>
+          <a:lstStyle/>
+          <a:p>
+            <a:fld id="{4025A6EF-7D2A-4597-A4A6-A9C8038BAFDF}" type="slidenum">
+              <a:rPr lang="en-IN" smtClean="0"/>
+              <a:t>3</a:t>
+            </a:fld>
+            <a:endParaRPr lang="en-IN"/>
+          </a:p>
+        </p:txBody>
+      </p:sp>
+    </p:spTree>
+    <p:extLst>
+      <p:ext uri="{BB962C8B-B14F-4D97-AF65-F5344CB8AC3E}">
+        <p14:creationId xmlns:p14="http://schemas.microsoft.com/office/powerpoint/2010/main" val="4263897330"/>
+      </p:ext>
+    </p:extLst>
+  </p:cSld>
+  <p:clrMapOvr>
+    <a:masterClrMapping/>
+  </p:clrMapOvr>
+</p:notes>
+</file>
+
+<file path=ppt/notesSlides/notesSlide2.xml><?xml version="1.0" encoding="utf-8"?>
+<p:notes xmlns:a="http://schemas.openxmlformats.org/drawingml/2006/main" xmlns:r="http://schemas.openxmlformats.org/officeDocument/2006/relationships" xmlns:p="http://schemas.openxmlformats.org/presentationml/2006/main">
+  <p:cSld>
+    <p:spTree>
+      <p:nvGrpSpPr>
+        <p:cNvPr id="1" name=""/>
+        <p:cNvGrpSpPr/>
+        <p:nvPr/>
+      </p:nvGrpSpPr>
+      <p:grpSpPr>
+        <a:xfrm>
+          <a:off x="0" y="0"/>
+          <a:ext cx="0" cy="0"/>
+          <a:chOff x="0" y="0"/>
+          <a:chExt cx="0" cy="0"/>
+        </a:xfrm>
+      </p:grpSpPr>
+      <p:sp>
+        <p:nvSpPr>
+          <p:cNvPr id="2" name="Slide Image Placeholder 1"/>
+          <p:cNvSpPr>
+            <a:spLocks noGrp="1" noRot="1" noChangeAspect="1"/>
+          </p:cNvSpPr>
+          <p:nvPr>
+            <p:ph type="sldImg"/>
+          </p:nvPr>
+        </p:nvSpPr>
+        <p:spPr/>
+      </p:sp>
+      <p:sp>
+        <p:nvSpPr>
+          <p:cNvPr id="3" name="Notes Placeholder 2"/>
+          <p:cNvSpPr>
+            <a:spLocks noGrp="1"/>
+          </p:cNvSpPr>
+          <p:nvPr>
+            <p:ph type="body" idx="1"/>
+          </p:nvPr>
+        </p:nvSpPr>
+        <p:spPr/>
+        <p:txBody>
+          <a:bodyPr/>
+          <a:lstStyle/>
+          <a:p>
+            <a:endParaRPr lang="en-IN" dirty="0"/>
+          </a:p>
+        </p:txBody>
+      </p:sp>
+      <p:sp>
+        <p:nvSpPr>
+          <p:cNvPr id="4" name="Slide Number Placeholder 3"/>
+          <p:cNvSpPr>
+            <a:spLocks noGrp="1"/>
+          </p:cNvSpPr>
+          <p:nvPr>
+            <p:ph type="sldNum" sz="quarter" idx="5"/>
+          </p:nvPr>
+        </p:nvSpPr>
+        <p:spPr/>
+        <p:txBody>
+          <a:bodyPr/>
+          <a:lstStyle/>
+          <a:p>
+            <a:fld id="{4025A6EF-7D2A-4597-A4A6-A9C8038BAFDF}" type="slidenum">
+              <a:rPr lang="en-IN" smtClean="0"/>
+              <a:t>4</a:t>
+            </a:fld>
+            <a:endParaRPr lang="en-IN"/>
+          </a:p>
+        </p:txBody>
+      </p:sp>
+    </p:spTree>
+    <p:extLst>
+      <p:ext uri="{BB962C8B-B14F-4D97-AF65-F5344CB8AC3E}">
+        <p14:creationId xmlns:p14="http://schemas.microsoft.com/office/powerpoint/2010/main" val="331892809"/>
+      </p:ext>
+    </p:extLst>
+  </p:cSld>
+  <p:clrMapOvr>
+    <a:masterClrMapping/>
+  </p:clrMapOvr>
+</p:notes>
+</file>
+
+<file path=ppt/notesSlides/notesSlide3.xml><?xml version="1.0" encoding="utf-8"?>
+<p:notes xmlns:a="http://schemas.openxmlformats.org/drawingml/2006/main" xmlns:r="http://schemas.openxmlformats.org/officeDocument/2006/relationships" xmlns:p="http://schemas.openxmlformats.org/presentationml/2006/main">
+  <p:cSld>
+    <p:spTree>
+      <p:nvGrpSpPr>
+        <p:cNvPr id="1" name=""/>
+        <p:cNvGrpSpPr/>
+        <p:nvPr/>
+      </p:nvGrpSpPr>
+      <p:grpSpPr>
+        <a:xfrm>
+          <a:off x="0" y="0"/>
+          <a:ext cx="0" cy="0"/>
+          <a:chOff x="0" y="0"/>
+          <a:chExt cx="0" cy="0"/>
+        </a:xfrm>
+      </p:grpSpPr>
+      <p:sp>
+        <p:nvSpPr>
+          <p:cNvPr id="2" name="Slide Image Placeholder 1"/>
+          <p:cNvSpPr>
+            <a:spLocks noGrp="1" noRot="1" noChangeAspect="1"/>
+          </p:cNvSpPr>
+          <p:nvPr>
+            <p:ph type="sldImg"/>
+          </p:nvPr>
+        </p:nvSpPr>
+        <p:spPr/>
+      </p:sp>
+      <p:sp>
+        <p:nvSpPr>
+          <p:cNvPr id="3" name="Notes Placeholder 2"/>
+          <p:cNvSpPr>
+            <a:spLocks noGrp="1"/>
+          </p:cNvSpPr>
+          <p:nvPr>
+            <p:ph type="body" idx="1"/>
+          </p:nvPr>
+        </p:nvSpPr>
+        <p:spPr/>
+        <p:txBody>
+          <a:bodyPr/>
+          <a:lstStyle/>
+          <a:p>
+            <a:endParaRPr lang="en-IN" dirty="0"/>
+          </a:p>
+        </p:txBody>
+      </p:sp>
+      <p:sp>
+        <p:nvSpPr>
+          <p:cNvPr id="4" name="Slide Number Placeholder 3"/>
+          <p:cNvSpPr>
+            <a:spLocks noGrp="1"/>
+          </p:cNvSpPr>
+          <p:nvPr>
+            <p:ph type="sldNum" sz="quarter" idx="5"/>
+          </p:nvPr>
+        </p:nvSpPr>
+        <p:spPr/>
+        <p:txBody>
+          <a:bodyPr/>
+          <a:lstStyle/>
+          <a:p>
+            <a:fld id="{4025A6EF-7D2A-4597-A4A6-A9C8038BAFDF}" type="slidenum">
+              <a:rPr lang="en-IN" smtClean="0"/>
+              <a:t>5</a:t>
+            </a:fld>
+            <a:endParaRPr lang="en-IN"/>
+          </a:p>
+        </p:txBody>
+      </p:sp>
+    </p:spTree>
+    <p:extLst>
+      <p:ext uri="{BB962C8B-B14F-4D97-AF65-F5344CB8AC3E}">
+        <p14:creationId xmlns:p14="http://schemas.microsoft.com/office/powerpoint/2010/main" val="1688152848"/>
+      </p:ext>
+    </p:extLst>
+  </p:cSld>
+  <p:clrMapOvr>
+    <a:masterClrMapping/>
+  </p:clrMapOvr>
+</p:notes>
+</file>
+
+<file path=ppt/notesSlides/notesSlide4.xml><?xml version="1.0" encoding="utf-8"?>
+<p:notes xmlns:a="http://schemas.openxmlformats.org/drawingml/2006/main" xmlns:r="http://schemas.openxmlformats.org/officeDocument/2006/relationships" xmlns:p="http://schemas.openxmlformats.org/presentationml/2006/main">
+  <p:cSld>
+    <p:spTree>
+      <p:nvGrpSpPr>
+        <p:cNvPr id="1" name=""/>
+        <p:cNvGrpSpPr/>
+        <p:nvPr/>
+      </p:nvGrpSpPr>
+      <p:grpSpPr>
+        <a:xfrm>
+          <a:off x="0" y="0"/>
+          <a:ext cx="0" cy="0"/>
+          <a:chOff x="0" y="0"/>
+          <a:chExt cx="0" cy="0"/>
+        </a:xfrm>
+      </p:grpSpPr>
+      <p:sp>
+        <p:nvSpPr>
+          <p:cNvPr id="2" name="Slide Image Placeholder 1"/>
+          <p:cNvSpPr>
+            <a:spLocks noGrp="1" noRot="1" noChangeAspect="1"/>
+          </p:cNvSpPr>
+          <p:nvPr>
+            <p:ph type="sldImg"/>
+          </p:nvPr>
+        </p:nvSpPr>
+        <p:spPr/>
+      </p:sp>
+      <p:sp>
+        <p:nvSpPr>
+          <p:cNvPr id="3" name="Notes Placeholder 2"/>
+          <p:cNvSpPr>
+            <a:spLocks noGrp="1"/>
+          </p:cNvSpPr>
+          <p:nvPr>
+            <p:ph type="body" idx="1"/>
+          </p:nvPr>
+        </p:nvSpPr>
+        <p:spPr/>
+        <p:txBody>
+          <a:bodyPr/>
+          <a:lstStyle/>
+          <a:p>
+            <a:endParaRPr lang="en-IN" dirty="0"/>
+          </a:p>
+        </p:txBody>
+      </p:sp>
+      <p:sp>
+        <p:nvSpPr>
+          <p:cNvPr id="4" name="Slide Number Placeholder 3"/>
+          <p:cNvSpPr>
+            <a:spLocks noGrp="1"/>
+          </p:cNvSpPr>
+          <p:nvPr>
+            <p:ph type="sldNum" sz="quarter" idx="5"/>
+          </p:nvPr>
+        </p:nvSpPr>
+        <p:spPr/>
+        <p:txBody>
+          <a:bodyPr/>
+          <a:lstStyle/>
+          <a:p>
+            <a:fld id="{4025A6EF-7D2A-4597-A4A6-A9C8038BAFDF}" type="slidenum">
+              <a:rPr lang="en-IN" smtClean="0"/>
+              <a:t>7</a:t>
+            </a:fld>
+            <a:endParaRPr lang="en-IN"/>
+          </a:p>
+        </p:txBody>
+      </p:sp>
+    </p:spTree>
+    <p:extLst>
+      <p:ext uri="{BB962C8B-B14F-4D97-AF65-F5344CB8AC3E}">
+        <p14:creationId xmlns:p14="http://schemas.microsoft.com/office/powerpoint/2010/main" val="325539915"/>
+      </p:ext>
+    </p:extLst>
+  </p:cSld>
+  <p:clrMapOvr>
+    <a:masterClrMapping/>
+  </p:clrMapOvr>
+</p:notes>
+</file>
+
+<file path=ppt/notesSlides/notesSlide5.xml><?xml version="1.0" encoding="utf-8"?>
+<p:notes xmlns:a="http://schemas.openxmlformats.org/drawingml/2006/main" xmlns:r="http://schemas.openxmlformats.org/officeDocument/2006/relationships" xmlns:p="http://schemas.openxmlformats.org/presentationml/2006/main">
+  <p:cSld>
+    <p:spTree>
+      <p:nvGrpSpPr>
+        <p:cNvPr id="1" name=""/>
+        <p:cNvGrpSpPr/>
+        <p:nvPr/>
+      </p:nvGrpSpPr>
+      <p:grpSpPr>
+        <a:xfrm>
+          <a:off x="0" y="0"/>
+          <a:ext cx="0" cy="0"/>
+          <a:chOff x="0" y="0"/>
+          <a:chExt cx="0" cy="0"/>
+        </a:xfrm>
+      </p:grpSpPr>
+      <p:sp>
+        <p:nvSpPr>
+          <p:cNvPr id="2" name="Slide Image Placeholder 1"/>
+          <p:cNvSpPr>
+            <a:spLocks noGrp="1" noRot="1" noChangeAspect="1"/>
+          </p:cNvSpPr>
+          <p:nvPr>
+            <p:ph type="sldImg"/>
+          </p:nvPr>
+        </p:nvSpPr>
+        <p:spPr/>
+      </p:sp>
+      <p:sp>
+        <p:nvSpPr>
+          <p:cNvPr id="3" name="Notes Placeholder 2"/>
+          <p:cNvSpPr>
+            <a:spLocks noGrp="1"/>
+          </p:cNvSpPr>
+          <p:nvPr>
+            <p:ph type="body" idx="1"/>
+          </p:nvPr>
+        </p:nvSpPr>
+        <p:spPr/>
+        <p:txBody>
+          <a:bodyPr/>
+          <a:lstStyle/>
+          <a:p>
+            <a:endParaRPr lang="en-IN" dirty="0"/>
+          </a:p>
+        </p:txBody>
+      </p:sp>
+      <p:sp>
+        <p:nvSpPr>
+          <p:cNvPr id="4" name="Slide Number Placeholder 3"/>
+          <p:cNvSpPr>
+            <a:spLocks noGrp="1"/>
+          </p:cNvSpPr>
+          <p:nvPr>
+            <p:ph type="sldNum" sz="quarter" idx="5"/>
+          </p:nvPr>
+        </p:nvSpPr>
+        <p:spPr/>
+        <p:txBody>
+          <a:bodyPr/>
+          <a:lstStyle/>
+          <a:p>
+            <a:fld id="{4025A6EF-7D2A-4597-A4A6-A9C8038BAFDF}" type="slidenum">
+              <a:rPr lang="en-IN" smtClean="0"/>
+              <a:t>8</a:t>
+            </a:fld>
+            <a:endParaRPr lang="en-IN"/>
+          </a:p>
+        </p:txBody>
+      </p:sp>
+    </p:spTree>
+    <p:extLst>
+      <p:ext uri="{BB962C8B-B14F-4D97-AF65-F5344CB8AC3E}">
+        <p14:creationId xmlns:p14="http://schemas.microsoft.com/office/powerpoint/2010/main" val="1933965748"/>
+      </p:ext>
+    </p:extLst>
+  </p:cSld>
+  <p:clrMapOvr>
+    <a:masterClrMapping/>
+  </p:clrMapOvr>
+</p:notes>
+</file>
+
+<file path=ppt/notesSlides/notesSlide6.xml><?xml version="1.0" encoding="utf-8"?>
+<p:notes xmlns:a="http://schemas.openxmlformats.org/drawingml/2006/main" xmlns:r="http://schemas.openxmlformats.org/officeDocument/2006/relationships" xmlns:p="http://schemas.openxmlformats.org/presentationml/2006/main">
+  <p:cSld>
+    <p:spTree>
+      <p:nvGrpSpPr>
+        <p:cNvPr id="1" name=""/>
+        <p:cNvGrpSpPr/>
+        <p:nvPr/>
+      </p:nvGrpSpPr>
+      <p:grpSpPr>
+        <a:xfrm>
+          <a:off x="0" y="0"/>
+          <a:ext cx="0" cy="0"/>
+          <a:chOff x="0" y="0"/>
+          <a:chExt cx="0" cy="0"/>
+        </a:xfrm>
+      </p:grpSpPr>
+      <p:sp>
+        <p:nvSpPr>
+          <p:cNvPr id="2" name="Slide Image Placeholder 1"/>
+          <p:cNvSpPr>
+            <a:spLocks noGrp="1" noRot="1" noChangeAspect="1"/>
+          </p:cNvSpPr>
+          <p:nvPr>
+            <p:ph type="sldImg"/>
+          </p:nvPr>
+        </p:nvSpPr>
+        <p:spPr/>
+      </p:sp>
+      <p:sp>
+        <p:nvSpPr>
+          <p:cNvPr id="3" name="Notes Placeholder 2"/>
+          <p:cNvSpPr>
+            <a:spLocks noGrp="1"/>
+          </p:cNvSpPr>
+          <p:nvPr>
+            <p:ph type="body" idx="1"/>
+          </p:nvPr>
+        </p:nvSpPr>
+        <p:spPr/>
+        <p:txBody>
+          <a:bodyPr/>
+          <a:lstStyle/>
+          <a:p>
+            <a:r>
+              <a:rPr lang="en-US" dirty="0"/>
+              <a:t>	</a:t>
+            </a:r>
+            <a:endParaRPr lang="en-IN" dirty="0"/>
+          </a:p>
+        </p:txBody>
+      </p:sp>
+      <p:sp>
+        <p:nvSpPr>
+          <p:cNvPr id="4" name="Slide Number Placeholder 3"/>
+          <p:cNvSpPr>
+            <a:spLocks noGrp="1"/>
+          </p:cNvSpPr>
+          <p:nvPr>
+            <p:ph type="sldNum" sz="quarter" idx="5"/>
+          </p:nvPr>
+        </p:nvSpPr>
+        <p:spPr/>
+        <p:txBody>
+          <a:bodyPr/>
+          <a:lstStyle/>
+          <a:p>
+            <a:fld id="{4025A6EF-7D2A-4597-A4A6-A9C8038BAFDF}" type="slidenum">
+              <a:rPr lang="en-IN" smtClean="0"/>
+              <a:t>9</a:t>
+            </a:fld>
+            <a:endParaRPr lang="en-IN"/>
+          </a:p>
+        </p:txBody>
+      </p:sp>
+    </p:spTree>
+    <p:extLst>
+      <p:ext uri="{BB962C8B-B14F-4D97-AF65-F5344CB8AC3E}">
+        <p14:creationId xmlns:p14="http://schemas.microsoft.com/office/powerpoint/2010/main" val="2687298238"/>
+      </p:ext>
+    </p:extLst>
+  </p:cSld>
+  <p:clrMapOvr>
+    <a:masterClrMapping/>
+  </p:clrMapOvr>
+</p:notes>
+</file>
+
+<file path=ppt/notesSlides/notesSlide7.xml><?xml version="1.0" encoding="utf-8"?>
+<p:notes xmlns:a="http://schemas.openxmlformats.org/drawingml/2006/main" xmlns:r="http://schemas.openxmlformats.org/officeDocument/2006/relationships" xmlns:p="http://schemas.openxmlformats.org/presentationml/2006/main">
+  <p:cSld>
+    <p:spTree>
+      <p:nvGrpSpPr>
+        <p:cNvPr id="1" name=""/>
+        <p:cNvGrpSpPr/>
+        <p:nvPr/>
+      </p:nvGrpSpPr>
+      <p:grpSpPr>
+        <a:xfrm>
+          <a:off x="0" y="0"/>
+          <a:ext cx="0" cy="0"/>
+          <a:chOff x="0" y="0"/>
+          <a:chExt cx="0" cy="0"/>
+        </a:xfrm>
+      </p:grpSpPr>
+      <p:sp>
+        <p:nvSpPr>
+          <p:cNvPr id="2" name="Slide Image Placeholder 1"/>
+          <p:cNvSpPr>
+            <a:spLocks noGrp="1" noRot="1" noChangeAspect="1"/>
+          </p:cNvSpPr>
+          <p:nvPr>
+            <p:ph type="sldImg"/>
+          </p:nvPr>
+        </p:nvSpPr>
+        <p:spPr/>
+      </p:sp>
+      <p:sp>
+        <p:nvSpPr>
+          <p:cNvPr id="3" name="Notes Placeholder 2"/>
+          <p:cNvSpPr>
+            <a:spLocks noGrp="1"/>
+          </p:cNvSpPr>
+          <p:nvPr>
+            <p:ph type="body" idx="1"/>
+          </p:nvPr>
+        </p:nvSpPr>
+        <p:spPr/>
+        <p:txBody>
+          <a:bodyPr/>
+          <a:lstStyle/>
+          <a:p>
+            <a:r>
+              <a:rPr lang="en-US" dirty="0"/>
+              <a:t>	</a:t>
+            </a:r>
+            <a:endParaRPr lang="en-IN" dirty="0"/>
+          </a:p>
+        </p:txBody>
+      </p:sp>
+      <p:sp>
+        <p:nvSpPr>
+          <p:cNvPr id="4" name="Slide Number Placeholder 3"/>
+          <p:cNvSpPr>
+            <a:spLocks noGrp="1"/>
+          </p:cNvSpPr>
+          <p:nvPr>
+            <p:ph type="sldNum" sz="quarter" idx="5"/>
+          </p:nvPr>
+        </p:nvSpPr>
+        <p:spPr/>
+        <p:txBody>
+          <a:bodyPr/>
+          <a:lstStyle/>
+          <a:p>
+            <a:fld id="{4025A6EF-7D2A-4597-A4A6-A9C8038BAFDF}" type="slidenum">
+              <a:rPr lang="en-IN" smtClean="0"/>
+              <a:t>10</a:t>
+            </a:fld>
+            <a:endParaRPr lang="en-IN"/>
+          </a:p>
+        </p:txBody>
+      </p:sp>
+    </p:spTree>
+    <p:extLst>
+      <p:ext uri="{BB962C8B-B14F-4D97-AF65-F5344CB8AC3E}">
+        <p14:creationId xmlns:p14="http://schemas.microsoft.com/office/powerpoint/2010/main" val="4112544317"/>
+      </p:ext>
+    </p:extLst>
+  </p:cSld>
+  <p:clrMapOvr>
+    <a:masterClrMapping/>
+  </p:clrMapOvr>
+</p:notes>
+</file>
+
+<file path=ppt/notesSlides/notesSlide8.xml><?xml version="1.0" encoding="utf-8"?>
+<p:notes xmlns:a="http://schemas.openxmlformats.org/drawingml/2006/main" xmlns:r="http://schemas.openxmlformats.org/officeDocument/2006/relationships" xmlns:p="http://schemas.openxmlformats.org/presentationml/2006/main">
+  <p:cSld>
+    <p:spTree>
+      <p:nvGrpSpPr>
+        <p:cNvPr id="1" name=""/>
+        <p:cNvGrpSpPr/>
+        <p:nvPr/>
+      </p:nvGrpSpPr>
+      <p:grpSpPr>
+        <a:xfrm>
+          <a:off x="0" y="0"/>
+          <a:ext cx="0" cy="0"/>
+          <a:chOff x="0" y="0"/>
+          <a:chExt cx="0" cy="0"/>
+        </a:xfrm>
+      </p:grpSpPr>
+      <p:sp>
+        <p:nvSpPr>
+          <p:cNvPr id="2" name="Slide Image Placeholder 1"/>
+          <p:cNvSpPr>
+            <a:spLocks noGrp="1" noRot="1" noChangeAspect="1"/>
+          </p:cNvSpPr>
+          <p:nvPr>
+            <p:ph type="sldImg"/>
+          </p:nvPr>
+        </p:nvSpPr>
+        <p:spPr/>
+      </p:sp>
+      <p:sp>
+        <p:nvSpPr>
+          <p:cNvPr id="3" name="Notes Placeholder 2"/>
+          <p:cNvSpPr>
+            <a:spLocks noGrp="1"/>
+          </p:cNvSpPr>
+          <p:nvPr>
+            <p:ph type="body" idx="1"/>
+          </p:nvPr>
+        </p:nvSpPr>
+        <p:spPr/>
+        <p:txBody>
+          <a:bodyPr/>
+          <a:lstStyle/>
+          <a:p>
+            <a:endParaRPr lang="en-IN" dirty="0"/>
+          </a:p>
+        </p:txBody>
+      </p:sp>
+      <p:sp>
+        <p:nvSpPr>
+          <p:cNvPr id="4" name="Slide Number Placeholder 3"/>
+          <p:cNvSpPr>
+            <a:spLocks noGrp="1"/>
+          </p:cNvSpPr>
+          <p:nvPr>
+            <p:ph type="sldNum" sz="quarter" idx="5"/>
+          </p:nvPr>
+        </p:nvSpPr>
+        <p:spPr/>
+        <p:txBody>
+          <a:bodyPr/>
+          <a:lstStyle/>
+          <a:p>
+            <a:fld id="{4025A6EF-7D2A-4597-A4A6-A9C8038BAFDF}" type="slidenum">
+              <a:rPr lang="en-IN" smtClean="0"/>
+              <a:t>11</a:t>
+            </a:fld>
+            <a:endParaRPr lang="en-IN"/>
+          </a:p>
+        </p:txBody>
+      </p:sp>
+    </p:spTree>
+    <p:extLst>
+      <p:ext uri="{BB962C8B-B14F-4D97-AF65-F5344CB8AC3E}">
+        <p14:creationId xmlns:p14="http://schemas.microsoft.com/office/powerpoint/2010/main" val="2996964189"/>
+      </p:ext>
+    </p:extLst>
+  </p:cSld>
+  <p:clrMapOvr>
+    <a:masterClrMapping/>
+  </p:clrMapOvr>
+</p:notes>
 </file>
 
 <file path=ppt/slideLayouts/slideLayout1.xml><?xml version="1.0" encoding="utf-8"?>
@@ -256,7 +1305,7 @@
           <a:p>
             <a:fld id="{C2E8E46C-F093-4A5F-8D2C-DDF78A663D14}" type="datetimeFigureOut">
               <a:rPr lang="en-IN" smtClean="0"/>
-              <a:t>05-04-2024</a:t>
+              <a:t>06-04-2024</a:t>
             </a:fld>
             <a:endParaRPr lang="en-IN"/>
           </a:p>
@@ -456,7 +1505,7 @@
           <a:p>
             <a:fld id="{C2E8E46C-F093-4A5F-8D2C-DDF78A663D14}" type="datetimeFigureOut">
               <a:rPr lang="en-IN" smtClean="0"/>
-              <a:t>05-04-2024</a:t>
+              <a:t>06-04-2024</a:t>
             </a:fld>
             <a:endParaRPr lang="en-IN"/>
           </a:p>
@@ -666,7 +1715,7 @@
           <a:p>
             <a:fld id="{C2E8E46C-F093-4A5F-8D2C-DDF78A663D14}" type="datetimeFigureOut">
               <a:rPr lang="en-IN" smtClean="0"/>
-              <a:t>05-04-2024</a:t>
+              <a:t>06-04-2024</a:t>
             </a:fld>
             <a:endParaRPr lang="en-IN"/>
           </a:p>
@@ -866,7 +1915,7 @@
           <a:p>
             <a:fld id="{C2E8E46C-F093-4A5F-8D2C-DDF78A663D14}" type="datetimeFigureOut">
               <a:rPr lang="en-IN" smtClean="0"/>
-              <a:t>05-04-2024</a:t>
+              <a:t>06-04-2024</a:t>
             </a:fld>
             <a:endParaRPr lang="en-IN"/>
           </a:p>
@@ -1142,7 +2191,7 @@
           <a:p>
             <a:fld id="{C2E8E46C-F093-4A5F-8D2C-DDF78A663D14}" type="datetimeFigureOut">
               <a:rPr lang="en-IN" smtClean="0"/>
-              <a:t>05-04-2024</a:t>
+              <a:t>06-04-2024</a:t>
             </a:fld>
             <a:endParaRPr lang="en-IN"/>
           </a:p>
@@ -1410,7 +2459,7 @@
           <a:p>
             <a:fld id="{C2E8E46C-F093-4A5F-8D2C-DDF78A663D14}" type="datetimeFigureOut">
               <a:rPr lang="en-IN" smtClean="0"/>
-              <a:t>05-04-2024</a:t>
+              <a:t>06-04-2024</a:t>
             </a:fld>
             <a:endParaRPr lang="en-IN"/>
           </a:p>
@@ -1825,7 +2874,7 @@
           <a:p>
             <a:fld id="{C2E8E46C-F093-4A5F-8D2C-DDF78A663D14}" type="datetimeFigureOut">
               <a:rPr lang="en-IN" smtClean="0"/>
-              <a:t>05-04-2024</a:t>
+              <a:t>06-04-2024</a:t>
             </a:fld>
             <a:endParaRPr lang="en-IN"/>
           </a:p>
@@ -1967,7 +3016,7 @@
           <a:p>
             <a:fld id="{C2E8E46C-F093-4A5F-8D2C-DDF78A663D14}" type="datetimeFigureOut">
               <a:rPr lang="en-IN" smtClean="0"/>
-              <a:t>05-04-2024</a:t>
+              <a:t>06-04-2024</a:t>
             </a:fld>
             <a:endParaRPr lang="en-IN"/>
           </a:p>
@@ -2080,7 +3129,7 @@
           <a:p>
             <a:fld id="{C2E8E46C-F093-4A5F-8D2C-DDF78A663D14}" type="datetimeFigureOut">
               <a:rPr lang="en-IN" smtClean="0"/>
-              <a:t>05-04-2024</a:t>
+              <a:t>06-04-2024</a:t>
             </a:fld>
             <a:endParaRPr lang="en-IN"/>
           </a:p>
@@ -2393,7 +3442,7 @@
           <a:p>
             <a:fld id="{C2E8E46C-F093-4A5F-8D2C-DDF78A663D14}" type="datetimeFigureOut">
               <a:rPr lang="en-IN" smtClean="0"/>
-              <a:t>05-04-2024</a:t>
+              <a:t>06-04-2024</a:t>
             </a:fld>
             <a:endParaRPr lang="en-IN"/>
           </a:p>
@@ -2682,7 +3731,7 @@
           <a:p>
             <a:fld id="{C2E8E46C-F093-4A5F-8D2C-DDF78A663D14}" type="datetimeFigureOut">
               <a:rPr lang="en-IN" smtClean="0"/>
-              <a:t>05-04-2024</a:t>
+              <a:t>06-04-2024</a:t>
             </a:fld>
             <a:endParaRPr lang="en-IN"/>
           </a:p>
@@ -2925,7 +3974,7 @@
           <a:p>
             <a:fld id="{C2E8E46C-F093-4A5F-8D2C-DDF78A663D14}" type="datetimeFigureOut">
               <a:rPr lang="en-IN" smtClean="0"/>
-              <a:t>05-04-2024</a:t>
+              <a:t>06-04-2024</a:t>
             </a:fld>
             <a:endParaRPr lang="en-IN"/>
           </a:p>
@@ -3328,6 +4377,14 @@
 <file path=ppt/slides/slide1.xml><?xml version="1.0" encoding="utf-8"?>
 <p:sld xmlns:a="http://schemas.openxmlformats.org/drawingml/2006/main" xmlns:r="http://schemas.openxmlformats.org/officeDocument/2006/relationships" xmlns:p="http://schemas.openxmlformats.org/presentationml/2006/main">
   <p:cSld>
+    <p:bg>
+      <p:bgPr>
+        <a:solidFill>
+          <a:srgbClr val="212121"/>
+        </a:solidFill>
+        <a:effectLst/>
+      </p:bgPr>
+    </p:bg>
     <p:spTree>
       <p:nvGrpSpPr>
         <p:cNvPr id="1" name=""/>
@@ -3358,12 +4415,37 @@
             <p:ph type="ctrTitle"/>
           </p:nvPr>
         </p:nvSpPr>
-        <p:spPr/>
-        <p:txBody>
-          <a:bodyPr/>
-          <a:lstStyle/>
-          <a:p>
-            <a:endParaRPr lang="en-IN"/>
+        <p:spPr>
+          <a:xfrm>
+            <a:off x="3864959" y="2670863"/>
+            <a:ext cx="6632929" cy="1516271"/>
+          </a:xfrm>
+        </p:spPr>
+        <p:txBody>
+          <a:bodyPr>
+            <a:normAutofit/>
+          </a:bodyPr>
+          <a:lstStyle/>
+          <a:p>
+            <a:r>
+              <a:rPr lang="en-US" sz="9600" dirty="0">
+                <a:solidFill>
+                  <a:srgbClr val="EEEEEE"/>
+                </a:solidFill>
+                <a:latin typeface="Cascadia Code SemiBold" panose="020B0609020000020004" pitchFamily="49" charset="0"/>
+                <a:ea typeface="Cascadia Code SemiBold" panose="020B0609020000020004" pitchFamily="49" charset="0"/>
+                <a:cs typeface="Cascadia Code SemiBold" panose="020B0609020000020004" pitchFamily="49" charset="0"/>
+              </a:rPr>
+              <a:t>GreenVolt</a:t>
+            </a:r>
+            <a:endParaRPr lang="en-IN" sz="9600" dirty="0">
+              <a:solidFill>
+                <a:srgbClr val="EEEEEE"/>
+              </a:solidFill>
+              <a:latin typeface="Cascadia Code SemiBold" panose="020B0609020000020004" pitchFamily="49" charset="0"/>
+              <a:ea typeface="Cascadia Code SemiBold" panose="020B0609020000020004" pitchFamily="49" charset="0"/>
+              <a:cs typeface="Cascadia Code SemiBold" panose="020B0609020000020004" pitchFamily="49" charset="0"/>
+            </a:endParaRPr>
           </a:p>
         </p:txBody>
       </p:sp>
@@ -3383,19 +4465,2462 @@
             <p:ph type="subTitle" idx="1"/>
           </p:nvPr>
         </p:nvSpPr>
-        <p:spPr/>
-        <p:txBody>
-          <a:bodyPr/>
-          <a:lstStyle/>
-          <a:p>
-            <a:endParaRPr lang="en-IN"/>
-          </a:p>
-        </p:txBody>
-      </p:sp>
+        <p:spPr>
+          <a:xfrm>
+            <a:off x="3864959" y="3998208"/>
+            <a:ext cx="4272197" cy="377851"/>
+          </a:xfrm>
+        </p:spPr>
+        <p:txBody>
+          <a:bodyPr>
+            <a:normAutofit fontScale="92500" lnSpcReduction="10000"/>
+          </a:bodyPr>
+          <a:lstStyle/>
+          <a:p>
+            <a:r>
+              <a:rPr lang="en-US" dirty="0">
+                <a:solidFill>
+                  <a:srgbClr val="EEEEEE"/>
+                </a:solidFill>
+                <a:latin typeface="Cascadia Code" panose="020B0609020000020004" pitchFamily="49" charset="0"/>
+                <a:ea typeface="Cascadia Code" panose="020B0609020000020004" pitchFamily="49" charset="0"/>
+                <a:cs typeface="Cascadia Code" panose="020B0609020000020004" pitchFamily="49" charset="0"/>
+              </a:rPr>
+              <a:t>Tagline or something idk.</a:t>
+            </a:r>
+            <a:endParaRPr lang="en-IN" dirty="0">
+              <a:solidFill>
+                <a:srgbClr val="EEEEEE"/>
+              </a:solidFill>
+              <a:latin typeface="Cascadia Code" panose="020B0609020000020004" pitchFamily="49" charset="0"/>
+              <a:ea typeface="Cascadia Code" panose="020B0609020000020004" pitchFamily="49" charset="0"/>
+              <a:cs typeface="Cascadia Code" panose="020B0609020000020004" pitchFamily="49" charset="0"/>
+            </a:endParaRPr>
+          </a:p>
+        </p:txBody>
+      </p:sp>
+      <p:pic>
+        <p:nvPicPr>
+          <p:cNvPr id="5" name="Graphic 4">
+            <a:extLst>
+              <a:ext uri="{FF2B5EF4-FFF2-40B4-BE49-F238E27FC236}">
+                <a16:creationId xmlns:a16="http://schemas.microsoft.com/office/drawing/2014/main" id="{A4BCB70E-E00F-89BB-D7AB-2C0D654A7F8C}"/>
+              </a:ext>
+            </a:extLst>
+          </p:cNvPr>
+          <p:cNvPicPr>
+            <a:picLocks noChangeAspect="1"/>
+          </p:cNvPicPr>
+          <p:nvPr/>
+        </p:nvPicPr>
+        <p:blipFill>
+          <a:blip r:embed="rId2">
+            <a:extLst>
+              <a:ext uri="{28A0092B-C50C-407E-A947-70E740481C1C}">
+                <a14:useLocalDpi xmlns:a14="http://schemas.microsoft.com/office/drawing/2010/main" val="0"/>
+              </a:ext>
+              <a:ext uri="{96DAC541-7B7A-43D3-8B79-37D633B846F1}">
+                <asvg:svgBlip xmlns:asvg="http://schemas.microsoft.com/office/drawing/2016/SVG/main" r:embed="rId3"/>
+              </a:ext>
+            </a:extLst>
+          </a:blip>
+          <a:stretch>
+            <a:fillRect/>
+          </a:stretch>
+        </p:blipFill>
+        <p:spPr>
+          <a:xfrm>
+            <a:off x="973917" y="1577810"/>
+            <a:ext cx="3088414" cy="3088414"/>
+          </a:xfrm>
+          <a:prstGeom prst="rect">
+            <a:avLst/>
+          </a:prstGeom>
+        </p:spPr>
+      </p:pic>
     </p:spTree>
     <p:extLst>
       <p:ext uri="{BB962C8B-B14F-4D97-AF65-F5344CB8AC3E}">
         <p14:creationId xmlns:p14="http://schemas.microsoft.com/office/powerpoint/2010/main" val="1925520087"/>
+      </p:ext>
+    </p:extLst>
+  </p:cSld>
+  <p:clrMapOvr>
+    <a:masterClrMapping/>
+  </p:clrMapOvr>
+</p:sld>
+</file>
+
+<file path=ppt/slides/slide10.xml><?xml version="1.0" encoding="utf-8"?>
+<p:sld xmlns:a="http://schemas.openxmlformats.org/drawingml/2006/main" xmlns:r="http://schemas.openxmlformats.org/officeDocument/2006/relationships" xmlns:p="http://schemas.openxmlformats.org/presentationml/2006/main">
+  <p:cSld>
+    <p:bg>
+      <p:bgPr>
+        <a:solidFill>
+          <a:srgbClr val="212121"/>
+        </a:solidFill>
+        <a:effectLst/>
+      </p:bgPr>
+    </p:bg>
+    <p:spTree>
+      <p:nvGrpSpPr>
+        <p:cNvPr id="1" name=""/>
+        <p:cNvGrpSpPr/>
+        <p:nvPr/>
+      </p:nvGrpSpPr>
+      <p:grpSpPr>
+        <a:xfrm>
+          <a:off x="0" y="0"/>
+          <a:ext cx="0" cy="0"/>
+          <a:chOff x="0" y="0"/>
+          <a:chExt cx="0" cy="0"/>
+        </a:xfrm>
+      </p:grpSpPr>
+      <p:sp>
+        <p:nvSpPr>
+          <p:cNvPr id="2" name="Title 1">
+            <a:extLst>
+              <a:ext uri="{FF2B5EF4-FFF2-40B4-BE49-F238E27FC236}">
+                <a16:creationId xmlns:a16="http://schemas.microsoft.com/office/drawing/2014/main" id="{A48F3F0A-DD67-2A6E-99E2-36E05BCD8A85}"/>
+              </a:ext>
+            </a:extLst>
+          </p:cNvPr>
+          <p:cNvSpPr>
+            <a:spLocks noGrp="1"/>
+          </p:cNvSpPr>
+          <p:nvPr>
+            <p:ph type="ctrTitle"/>
+          </p:nvPr>
+        </p:nvSpPr>
+        <p:spPr>
+          <a:xfrm>
+            <a:off x="1491521" y="381188"/>
+            <a:ext cx="3182079" cy="677312"/>
+          </a:xfrm>
+        </p:spPr>
+        <p:txBody>
+          <a:bodyPr>
+            <a:noAutofit/>
+          </a:bodyPr>
+          <a:lstStyle/>
+          <a:p>
+            <a:r>
+              <a:rPr lang="en-US" sz="4400" dirty="0">
+                <a:solidFill>
+                  <a:srgbClr val="EEEEEE"/>
+                </a:solidFill>
+                <a:latin typeface="Cascadia Code SemiBold" panose="020B0609020000020004" pitchFamily="49" charset="0"/>
+                <a:ea typeface="Cascadia Code SemiBold" panose="020B0609020000020004" pitchFamily="49" charset="0"/>
+                <a:cs typeface="Cascadia Code SemiBold" panose="020B0609020000020004" pitchFamily="49" charset="0"/>
+              </a:rPr>
+              <a:t>Prototype</a:t>
+            </a:r>
+            <a:endParaRPr lang="en-IN" sz="4400" dirty="0">
+              <a:solidFill>
+                <a:srgbClr val="EEEEEE"/>
+              </a:solidFill>
+              <a:latin typeface="Cascadia Code SemiBold" panose="020B0609020000020004" pitchFamily="49" charset="0"/>
+              <a:ea typeface="Cascadia Code SemiBold" panose="020B0609020000020004" pitchFamily="49" charset="0"/>
+              <a:cs typeface="Cascadia Code SemiBold" panose="020B0609020000020004" pitchFamily="49" charset="0"/>
+            </a:endParaRPr>
+          </a:p>
+        </p:txBody>
+      </p:sp>
+      <p:sp>
+        <p:nvSpPr>
+          <p:cNvPr id="3" name="Subtitle 2">
+            <a:extLst>
+              <a:ext uri="{FF2B5EF4-FFF2-40B4-BE49-F238E27FC236}">
+                <a16:creationId xmlns:a16="http://schemas.microsoft.com/office/drawing/2014/main" id="{D006C8C8-3712-034B-F68E-BF266CFED071}"/>
+              </a:ext>
+            </a:extLst>
+          </p:cNvPr>
+          <p:cNvSpPr>
+            <a:spLocks noGrp="1"/>
+          </p:cNvSpPr>
+          <p:nvPr>
+            <p:ph type="subTitle" idx="1"/>
+          </p:nvPr>
+        </p:nvSpPr>
+        <p:spPr>
+          <a:xfrm>
+            <a:off x="509228" y="1363482"/>
+            <a:ext cx="11070674" cy="5113330"/>
+          </a:xfrm>
+        </p:spPr>
+        <p:txBody>
+          <a:bodyPr>
+            <a:normAutofit/>
+          </a:bodyPr>
+          <a:lstStyle/>
+          <a:p>
+            <a:r>
+              <a:rPr lang="en-US" sz="3600" dirty="0">
+                <a:solidFill>
+                  <a:srgbClr val="EEEEEE"/>
+                </a:solidFill>
+                <a:latin typeface="Cascadia Code" panose="020B0609020000020004" pitchFamily="49" charset="0"/>
+                <a:ea typeface="Cascadia Code" panose="020B0609020000020004" pitchFamily="49" charset="0"/>
+                <a:cs typeface="Cascadia Code" panose="020B0609020000020004" pitchFamily="49" charset="0"/>
+              </a:rPr>
+              <a:t>Sign up and join us now!</a:t>
+            </a:r>
+            <a:endParaRPr lang="en-IN" sz="3600" dirty="0">
+              <a:solidFill>
+                <a:srgbClr val="EEEEEE"/>
+              </a:solidFill>
+              <a:latin typeface="Cascadia Code" panose="020B0609020000020004" pitchFamily="49" charset="0"/>
+              <a:ea typeface="Cascadia Code" panose="020B0609020000020004" pitchFamily="49" charset="0"/>
+              <a:cs typeface="Cascadia Code" panose="020B0609020000020004" pitchFamily="49" charset="0"/>
+            </a:endParaRPr>
+          </a:p>
+        </p:txBody>
+      </p:sp>
+      <p:pic>
+        <p:nvPicPr>
+          <p:cNvPr id="5" name="Graphic 4">
+            <a:extLst>
+              <a:ext uri="{FF2B5EF4-FFF2-40B4-BE49-F238E27FC236}">
+                <a16:creationId xmlns:a16="http://schemas.microsoft.com/office/drawing/2014/main" id="{A4BCB70E-E00F-89BB-D7AB-2C0D654A7F8C}"/>
+              </a:ext>
+            </a:extLst>
+          </p:cNvPr>
+          <p:cNvPicPr>
+            <a:picLocks noChangeAspect="1"/>
+          </p:cNvPicPr>
+          <p:nvPr/>
+        </p:nvPicPr>
+        <p:blipFill>
+          <a:blip r:embed="rId3">
+            <a:extLst>
+              <a:ext uri="{28A0092B-C50C-407E-A947-70E740481C1C}">
+                <a14:useLocalDpi xmlns:a14="http://schemas.microsoft.com/office/drawing/2010/main" val="0"/>
+              </a:ext>
+              <a:ext uri="{96DAC541-7B7A-43D3-8B79-37D633B846F1}">
+                <asvg:svgBlip xmlns:asvg="http://schemas.microsoft.com/office/drawing/2016/SVG/main" r:embed="rId4"/>
+              </a:ext>
+            </a:extLst>
+          </a:blip>
+          <a:stretch>
+            <a:fillRect/>
+          </a:stretch>
+        </p:blipFill>
+        <p:spPr>
+          <a:xfrm>
+            <a:off x="509228" y="228697"/>
+            <a:ext cx="982294" cy="982294"/>
+          </a:xfrm>
+          <a:prstGeom prst="rect">
+            <a:avLst/>
+          </a:prstGeom>
+        </p:spPr>
+      </p:pic>
+      <p:pic>
+        <p:nvPicPr>
+          <p:cNvPr id="7" name="Picture 6">
+            <a:extLst>
+              <a:ext uri="{FF2B5EF4-FFF2-40B4-BE49-F238E27FC236}">
+                <a16:creationId xmlns:a16="http://schemas.microsoft.com/office/drawing/2014/main" id="{5A47DAC9-973A-A46C-AA4B-ED08A679CC19}"/>
+              </a:ext>
+            </a:extLst>
+          </p:cNvPr>
+          <p:cNvPicPr>
+            <a:picLocks noChangeAspect="1"/>
+          </p:cNvPicPr>
+          <p:nvPr/>
+        </p:nvPicPr>
+        <p:blipFill>
+          <a:blip r:embed="rId5">
+            <a:extLst>
+              <a:ext uri="{28A0092B-C50C-407E-A947-70E740481C1C}">
+                <a14:useLocalDpi xmlns:a14="http://schemas.microsoft.com/office/drawing/2010/main" val="0"/>
+              </a:ext>
+            </a:extLst>
+          </a:blip>
+          <a:srcRect l="483" r="483"/>
+          <a:stretch/>
+        </p:blipFill>
+        <p:spPr>
+          <a:xfrm>
+            <a:off x="1593554" y="2038276"/>
+            <a:ext cx="8902022" cy="4317080"/>
+          </a:xfrm>
+          <a:prstGeom prst="snip2DiagRect">
+            <a:avLst/>
+          </a:prstGeom>
+          <a:solidFill>
+            <a:srgbClr val="FFFFFF">
+              <a:shade val="85000"/>
+            </a:srgbClr>
+          </a:solidFill>
+          <a:ln w="88900" cap="sq">
+            <a:solidFill>
+              <a:srgbClr val="FFFFFF"/>
+            </a:solidFill>
+            <a:miter lim="800000"/>
+          </a:ln>
+          <a:effectLst>
+            <a:outerShdw blurRad="88900" algn="tl" rotWithShape="0">
+              <a:srgbClr val="000000">
+                <a:alpha val="45000"/>
+              </a:srgbClr>
+            </a:outerShdw>
+          </a:effectLst>
+          <a:scene3d>
+            <a:camera prst="orthographicFront"/>
+            <a:lightRig rig="twoPt" dir="t">
+              <a:rot lat="0" lon="0" rev="7200000"/>
+            </a:lightRig>
+          </a:scene3d>
+          <a:sp3d>
+            <a:bevelT w="25400" h="19050"/>
+            <a:contourClr>
+              <a:srgbClr val="FFFFFF"/>
+            </a:contourClr>
+          </a:sp3d>
+        </p:spPr>
+      </p:pic>
+    </p:spTree>
+    <p:extLst>
+      <p:ext uri="{BB962C8B-B14F-4D97-AF65-F5344CB8AC3E}">
+        <p14:creationId xmlns:p14="http://schemas.microsoft.com/office/powerpoint/2010/main" val="1982404273"/>
+      </p:ext>
+    </p:extLst>
+  </p:cSld>
+  <p:clrMapOvr>
+    <a:masterClrMapping/>
+  </p:clrMapOvr>
+</p:sld>
+</file>
+
+<file path=ppt/slides/slide11.xml><?xml version="1.0" encoding="utf-8"?>
+<p:sld xmlns:a="http://schemas.openxmlformats.org/drawingml/2006/main" xmlns:r="http://schemas.openxmlformats.org/officeDocument/2006/relationships" xmlns:p="http://schemas.openxmlformats.org/presentationml/2006/main">
+  <p:cSld>
+    <p:bg>
+      <p:bgPr>
+        <a:solidFill>
+          <a:srgbClr val="212121"/>
+        </a:solidFill>
+        <a:effectLst/>
+      </p:bgPr>
+    </p:bg>
+    <p:spTree>
+      <p:nvGrpSpPr>
+        <p:cNvPr id="1" name=""/>
+        <p:cNvGrpSpPr/>
+        <p:nvPr/>
+      </p:nvGrpSpPr>
+      <p:grpSpPr>
+        <a:xfrm>
+          <a:off x="0" y="0"/>
+          <a:ext cx="0" cy="0"/>
+          <a:chOff x="0" y="0"/>
+          <a:chExt cx="0" cy="0"/>
+        </a:xfrm>
+      </p:grpSpPr>
+      <p:sp>
+        <p:nvSpPr>
+          <p:cNvPr id="2" name="Title 1">
+            <a:extLst>
+              <a:ext uri="{FF2B5EF4-FFF2-40B4-BE49-F238E27FC236}">
+                <a16:creationId xmlns:a16="http://schemas.microsoft.com/office/drawing/2014/main" id="{A48F3F0A-DD67-2A6E-99E2-36E05BCD8A85}"/>
+              </a:ext>
+            </a:extLst>
+          </p:cNvPr>
+          <p:cNvSpPr>
+            <a:spLocks noGrp="1"/>
+          </p:cNvSpPr>
+          <p:nvPr>
+            <p:ph type="ctrTitle"/>
+          </p:nvPr>
+        </p:nvSpPr>
+        <p:spPr>
+          <a:xfrm>
+            <a:off x="1491522" y="381188"/>
+            <a:ext cx="1549222" cy="677312"/>
+          </a:xfrm>
+        </p:spPr>
+        <p:txBody>
+          <a:bodyPr>
+            <a:noAutofit/>
+          </a:bodyPr>
+          <a:lstStyle/>
+          <a:p>
+            <a:r>
+              <a:rPr lang="en-US" sz="4400" dirty="0">
+                <a:solidFill>
+                  <a:srgbClr val="EEEEEE"/>
+                </a:solidFill>
+                <a:latin typeface="Cascadia Code SemiBold" panose="020B0609020000020004" pitchFamily="49" charset="0"/>
+                <a:ea typeface="Cascadia Code SemiBold" panose="020B0609020000020004" pitchFamily="49" charset="0"/>
+                <a:cs typeface="Cascadia Code SemiBold" panose="020B0609020000020004" pitchFamily="49" charset="0"/>
+              </a:rPr>
+              <a:t>Team</a:t>
+            </a:r>
+            <a:endParaRPr lang="en-IN" sz="4400" dirty="0">
+              <a:solidFill>
+                <a:srgbClr val="EEEEEE"/>
+              </a:solidFill>
+              <a:latin typeface="Cascadia Code SemiBold" panose="020B0609020000020004" pitchFamily="49" charset="0"/>
+              <a:ea typeface="Cascadia Code SemiBold" panose="020B0609020000020004" pitchFamily="49" charset="0"/>
+              <a:cs typeface="Cascadia Code SemiBold" panose="020B0609020000020004" pitchFamily="49" charset="0"/>
+            </a:endParaRPr>
+          </a:p>
+        </p:txBody>
+      </p:sp>
+      <p:sp>
+        <p:nvSpPr>
+          <p:cNvPr id="3" name="Subtitle 2">
+            <a:extLst>
+              <a:ext uri="{FF2B5EF4-FFF2-40B4-BE49-F238E27FC236}">
+                <a16:creationId xmlns:a16="http://schemas.microsoft.com/office/drawing/2014/main" id="{D006C8C8-3712-034B-F68E-BF266CFED071}"/>
+              </a:ext>
+            </a:extLst>
+          </p:cNvPr>
+          <p:cNvSpPr>
+            <a:spLocks noGrp="1"/>
+          </p:cNvSpPr>
+          <p:nvPr>
+            <p:ph type="subTitle" idx="1"/>
+          </p:nvPr>
+        </p:nvSpPr>
+        <p:spPr>
+          <a:xfrm>
+            <a:off x="509228" y="1363482"/>
+            <a:ext cx="11070674" cy="5113330"/>
+          </a:xfrm>
+        </p:spPr>
+        <p:txBody>
+          <a:bodyPr>
+            <a:normAutofit/>
+          </a:bodyPr>
+          <a:lstStyle/>
+          <a:p>
+            <a:pPr algn="l"/>
+            <a:r>
+              <a:rPr lang="en-US" dirty="0">
+                <a:solidFill>
+                  <a:srgbClr val="EEEEEE"/>
+                </a:solidFill>
+                <a:latin typeface="Cascadia Code" panose="020B0609020000020004" pitchFamily="49" charset="0"/>
+                <a:ea typeface="Cascadia Code" panose="020B0609020000020004" pitchFamily="49" charset="0"/>
+                <a:cs typeface="Cascadia Code" panose="020B0609020000020004" pitchFamily="49" charset="0"/>
+              </a:rPr>
+              <a:t>Sometimes working leads to the greatest inventions.</a:t>
+            </a:r>
+          </a:p>
+          <a:p>
+            <a:pPr algn="l"/>
+            <a:endParaRPr lang="en-US" dirty="0">
+              <a:solidFill>
+                <a:srgbClr val="EEEEEE"/>
+              </a:solidFill>
+              <a:latin typeface="Cascadia Code" panose="020B0609020000020004" pitchFamily="49" charset="0"/>
+              <a:ea typeface="Cascadia Code" panose="020B0609020000020004" pitchFamily="49" charset="0"/>
+              <a:cs typeface="Cascadia Code" panose="020B0609020000020004" pitchFamily="49" charset="0"/>
+            </a:endParaRPr>
+          </a:p>
+          <a:p>
+            <a:pPr algn="l"/>
+            <a:r>
+              <a:rPr lang="en-IN" sz="4000" dirty="0">
+                <a:solidFill>
+                  <a:srgbClr val="EEEEEE"/>
+                </a:solidFill>
+                <a:latin typeface="Cascadia Code" panose="020B0609020000020004" pitchFamily="49" charset="0"/>
+                <a:ea typeface="Cascadia Code" panose="020B0609020000020004" pitchFamily="49" charset="0"/>
+                <a:cs typeface="Cascadia Code" panose="020B0609020000020004" pitchFamily="49" charset="0"/>
+              </a:rPr>
+              <a:t>NAME: Krish Sharma</a:t>
+            </a:r>
+          </a:p>
+          <a:p>
+            <a:pPr algn="l"/>
+            <a:r>
+              <a:rPr lang="en-IN" sz="4000" dirty="0">
+                <a:solidFill>
+                  <a:srgbClr val="EEEEEE"/>
+                </a:solidFill>
+                <a:latin typeface="Cascadia Code" panose="020B0609020000020004" pitchFamily="49" charset="0"/>
+                <a:ea typeface="Cascadia Code" panose="020B0609020000020004" pitchFamily="49" charset="0"/>
+                <a:cs typeface="Cascadia Code" panose="020B0609020000020004" pitchFamily="49" charset="0"/>
+              </a:rPr>
+              <a:t>Institute: Manipal University Jaipur</a:t>
+            </a:r>
+          </a:p>
+          <a:p>
+            <a:pPr algn="l"/>
+            <a:r>
+              <a:rPr lang="en-IN" sz="4000" dirty="0">
+                <a:solidFill>
+                  <a:srgbClr val="EEEEEE"/>
+                </a:solidFill>
+                <a:latin typeface="Cascadia Code" panose="020B0609020000020004" pitchFamily="49" charset="0"/>
+                <a:ea typeface="Cascadia Code" panose="020B0609020000020004" pitchFamily="49" charset="0"/>
+                <a:cs typeface="Cascadia Code" panose="020B0609020000020004" pitchFamily="49" charset="0"/>
+              </a:rPr>
+              <a:t>Registration Number: 23FE10CAI00138</a:t>
+            </a:r>
+          </a:p>
+          <a:p>
+            <a:pPr algn="l"/>
+            <a:r>
+              <a:rPr lang="en-IN" sz="4000" dirty="0">
+                <a:solidFill>
+                  <a:srgbClr val="EEEEEE"/>
+                </a:solidFill>
+                <a:latin typeface="Cascadia Code" panose="020B0609020000020004" pitchFamily="49" charset="0"/>
+                <a:ea typeface="Cascadia Code" panose="020B0609020000020004" pitchFamily="49" charset="0"/>
+                <a:cs typeface="Cascadia Code" panose="020B0609020000020004" pitchFamily="49" charset="0"/>
+              </a:rPr>
+              <a:t>Phone No: +91 8287735005</a:t>
+            </a:r>
+          </a:p>
+          <a:p>
+            <a:pPr algn="l"/>
+            <a:r>
+              <a:rPr lang="en-IN" sz="4000" dirty="0">
+                <a:solidFill>
+                  <a:srgbClr val="EEEEEE"/>
+                </a:solidFill>
+                <a:latin typeface="Cascadia Code" panose="020B0609020000020004" pitchFamily="49" charset="0"/>
+                <a:ea typeface="Cascadia Code" panose="020B0609020000020004" pitchFamily="49" charset="0"/>
+                <a:cs typeface="Cascadia Code" panose="020B0609020000020004" pitchFamily="49" charset="0"/>
+              </a:rPr>
+              <a:t>Mail: krishsharma0413@gmail.com</a:t>
+            </a:r>
+          </a:p>
+        </p:txBody>
+      </p:sp>
+      <p:pic>
+        <p:nvPicPr>
+          <p:cNvPr id="5" name="Graphic 4">
+            <a:extLst>
+              <a:ext uri="{FF2B5EF4-FFF2-40B4-BE49-F238E27FC236}">
+                <a16:creationId xmlns:a16="http://schemas.microsoft.com/office/drawing/2014/main" id="{A4BCB70E-E00F-89BB-D7AB-2C0D654A7F8C}"/>
+              </a:ext>
+            </a:extLst>
+          </p:cNvPr>
+          <p:cNvPicPr>
+            <a:picLocks noChangeAspect="1"/>
+          </p:cNvPicPr>
+          <p:nvPr/>
+        </p:nvPicPr>
+        <p:blipFill>
+          <a:blip r:embed="rId3">
+            <a:extLst>
+              <a:ext uri="{28A0092B-C50C-407E-A947-70E740481C1C}">
+                <a14:useLocalDpi xmlns:a14="http://schemas.microsoft.com/office/drawing/2010/main" val="0"/>
+              </a:ext>
+              <a:ext uri="{96DAC541-7B7A-43D3-8B79-37D633B846F1}">
+                <asvg:svgBlip xmlns:asvg="http://schemas.microsoft.com/office/drawing/2016/SVG/main" r:embed="rId4"/>
+              </a:ext>
+            </a:extLst>
+          </a:blip>
+          <a:stretch>
+            <a:fillRect/>
+          </a:stretch>
+        </p:blipFill>
+        <p:spPr>
+          <a:xfrm>
+            <a:off x="509228" y="228697"/>
+            <a:ext cx="982294" cy="982294"/>
+          </a:xfrm>
+          <a:prstGeom prst="rect">
+            <a:avLst/>
+          </a:prstGeom>
+        </p:spPr>
+      </p:pic>
+    </p:spTree>
+    <p:extLst>
+      <p:ext uri="{BB962C8B-B14F-4D97-AF65-F5344CB8AC3E}">
+        <p14:creationId xmlns:p14="http://schemas.microsoft.com/office/powerpoint/2010/main" val="422533234"/>
+      </p:ext>
+    </p:extLst>
+  </p:cSld>
+  <p:clrMapOvr>
+    <a:masterClrMapping/>
+  </p:clrMapOvr>
+</p:sld>
+</file>
+
+<file path=ppt/slides/slide12.xml><?xml version="1.0" encoding="utf-8"?>
+<p:sld xmlns:a="http://schemas.openxmlformats.org/drawingml/2006/main" xmlns:r="http://schemas.openxmlformats.org/officeDocument/2006/relationships" xmlns:p="http://schemas.openxmlformats.org/presentationml/2006/main">
+  <p:cSld>
+    <p:bg>
+      <p:bgPr>
+        <a:solidFill>
+          <a:srgbClr val="212121"/>
+        </a:solidFill>
+        <a:effectLst/>
+      </p:bgPr>
+    </p:bg>
+    <p:spTree>
+      <p:nvGrpSpPr>
+        <p:cNvPr id="1" name=""/>
+        <p:cNvGrpSpPr/>
+        <p:nvPr/>
+      </p:nvGrpSpPr>
+      <p:grpSpPr>
+        <a:xfrm>
+          <a:off x="0" y="0"/>
+          <a:ext cx="0" cy="0"/>
+          <a:chOff x="0" y="0"/>
+          <a:chExt cx="0" cy="0"/>
+        </a:xfrm>
+      </p:grpSpPr>
+      <p:sp>
+        <p:nvSpPr>
+          <p:cNvPr id="2" name="Title 1">
+            <a:extLst>
+              <a:ext uri="{FF2B5EF4-FFF2-40B4-BE49-F238E27FC236}">
+                <a16:creationId xmlns:a16="http://schemas.microsoft.com/office/drawing/2014/main" id="{A48F3F0A-DD67-2A6E-99E2-36E05BCD8A85}"/>
+              </a:ext>
+            </a:extLst>
+          </p:cNvPr>
+          <p:cNvSpPr>
+            <a:spLocks noGrp="1"/>
+          </p:cNvSpPr>
+          <p:nvPr>
+            <p:ph type="ctrTitle"/>
+          </p:nvPr>
+        </p:nvSpPr>
+        <p:spPr>
+          <a:xfrm>
+            <a:off x="3761274" y="1843367"/>
+            <a:ext cx="6932950" cy="3171266"/>
+          </a:xfrm>
+        </p:spPr>
+        <p:txBody>
+          <a:bodyPr>
+            <a:noAutofit/>
+          </a:bodyPr>
+          <a:lstStyle/>
+          <a:p>
+            <a:r>
+              <a:rPr lang="en-US" sz="11500" dirty="0">
+                <a:solidFill>
+                  <a:srgbClr val="EEEEEE"/>
+                </a:solidFill>
+                <a:latin typeface="Cascadia Code SemiBold" panose="020B0609020000020004" pitchFamily="49" charset="0"/>
+                <a:ea typeface="Cascadia Code SemiBold" panose="020B0609020000020004" pitchFamily="49" charset="0"/>
+                <a:cs typeface="Cascadia Code SemiBold" panose="020B0609020000020004" pitchFamily="49" charset="0"/>
+              </a:rPr>
+              <a:t>Thank You</a:t>
+            </a:r>
+            <a:endParaRPr lang="en-IN" sz="11500" dirty="0">
+              <a:solidFill>
+                <a:srgbClr val="EEEEEE"/>
+              </a:solidFill>
+              <a:latin typeface="Cascadia Code SemiBold" panose="020B0609020000020004" pitchFamily="49" charset="0"/>
+              <a:ea typeface="Cascadia Code SemiBold" panose="020B0609020000020004" pitchFamily="49" charset="0"/>
+              <a:cs typeface="Cascadia Code SemiBold" panose="020B0609020000020004" pitchFamily="49" charset="0"/>
+            </a:endParaRPr>
+          </a:p>
+        </p:txBody>
+      </p:sp>
+      <p:pic>
+        <p:nvPicPr>
+          <p:cNvPr id="5" name="Graphic 4">
+            <a:extLst>
+              <a:ext uri="{FF2B5EF4-FFF2-40B4-BE49-F238E27FC236}">
+                <a16:creationId xmlns:a16="http://schemas.microsoft.com/office/drawing/2014/main" id="{A4BCB70E-E00F-89BB-D7AB-2C0D654A7F8C}"/>
+              </a:ext>
+            </a:extLst>
+          </p:cNvPr>
+          <p:cNvPicPr>
+            <a:picLocks noChangeAspect="1"/>
+          </p:cNvPicPr>
+          <p:nvPr/>
+        </p:nvPicPr>
+        <p:blipFill>
+          <a:blip r:embed="rId2">
+            <a:extLst>
+              <a:ext uri="{28A0092B-C50C-407E-A947-70E740481C1C}">
+                <a14:useLocalDpi xmlns:a14="http://schemas.microsoft.com/office/drawing/2010/main" val="0"/>
+              </a:ext>
+              <a:ext uri="{96DAC541-7B7A-43D3-8B79-37D633B846F1}">
+                <asvg:svgBlip xmlns:asvg="http://schemas.microsoft.com/office/drawing/2016/SVG/main" r:embed="rId3"/>
+              </a:ext>
+            </a:extLst>
+          </a:blip>
+          <a:stretch>
+            <a:fillRect/>
+          </a:stretch>
+        </p:blipFill>
+        <p:spPr>
+          <a:xfrm>
+            <a:off x="2128307" y="1796033"/>
+            <a:ext cx="3265934" cy="3265934"/>
+          </a:xfrm>
+          <a:prstGeom prst="rect">
+            <a:avLst/>
+          </a:prstGeom>
+        </p:spPr>
+      </p:pic>
+    </p:spTree>
+    <p:extLst>
+      <p:ext uri="{BB962C8B-B14F-4D97-AF65-F5344CB8AC3E}">
+        <p14:creationId xmlns:p14="http://schemas.microsoft.com/office/powerpoint/2010/main" val="3619122355"/>
+      </p:ext>
+    </p:extLst>
+  </p:cSld>
+  <p:clrMapOvr>
+    <a:masterClrMapping/>
+  </p:clrMapOvr>
+</p:sld>
+</file>
+
+<file path=ppt/slides/slide2.xml><?xml version="1.0" encoding="utf-8"?>
+<p:sld xmlns:a="http://schemas.openxmlformats.org/drawingml/2006/main" xmlns:r="http://schemas.openxmlformats.org/officeDocument/2006/relationships" xmlns:p="http://schemas.openxmlformats.org/presentationml/2006/main">
+  <p:cSld>
+    <p:bg>
+      <p:bgPr>
+        <a:solidFill>
+          <a:srgbClr val="212121"/>
+        </a:solidFill>
+        <a:effectLst/>
+      </p:bgPr>
+    </p:bg>
+    <p:spTree>
+      <p:nvGrpSpPr>
+        <p:cNvPr id="1" name=""/>
+        <p:cNvGrpSpPr/>
+        <p:nvPr/>
+      </p:nvGrpSpPr>
+      <p:grpSpPr>
+        <a:xfrm>
+          <a:off x="0" y="0"/>
+          <a:ext cx="0" cy="0"/>
+          <a:chOff x="0" y="0"/>
+          <a:chExt cx="0" cy="0"/>
+        </a:xfrm>
+      </p:grpSpPr>
+      <p:sp>
+        <p:nvSpPr>
+          <p:cNvPr id="2" name="Title 1">
+            <a:extLst>
+              <a:ext uri="{FF2B5EF4-FFF2-40B4-BE49-F238E27FC236}">
+                <a16:creationId xmlns:a16="http://schemas.microsoft.com/office/drawing/2014/main" id="{A48F3F0A-DD67-2A6E-99E2-36E05BCD8A85}"/>
+              </a:ext>
+            </a:extLst>
+          </p:cNvPr>
+          <p:cNvSpPr>
+            <a:spLocks noGrp="1"/>
+          </p:cNvSpPr>
+          <p:nvPr>
+            <p:ph type="ctrTitle"/>
+          </p:nvPr>
+        </p:nvSpPr>
+        <p:spPr>
+          <a:xfrm>
+            <a:off x="1491522" y="381188"/>
+            <a:ext cx="6098716" cy="677312"/>
+          </a:xfrm>
+        </p:spPr>
+        <p:txBody>
+          <a:bodyPr>
+            <a:noAutofit/>
+          </a:bodyPr>
+          <a:lstStyle/>
+          <a:p>
+            <a:r>
+              <a:rPr lang="en-US" sz="4400" dirty="0">
+                <a:solidFill>
+                  <a:srgbClr val="EEEEEE"/>
+                </a:solidFill>
+                <a:latin typeface="Cascadia Code SemiBold" panose="020B0609020000020004" pitchFamily="49" charset="0"/>
+                <a:ea typeface="Cascadia Code SemiBold" panose="020B0609020000020004" pitchFamily="49" charset="0"/>
+                <a:cs typeface="Cascadia Code SemiBold" panose="020B0609020000020004" pitchFamily="49" charset="0"/>
+              </a:rPr>
+              <a:t>What is GreenVolt?</a:t>
+            </a:r>
+            <a:endParaRPr lang="en-IN" sz="4400" dirty="0">
+              <a:solidFill>
+                <a:srgbClr val="EEEEEE"/>
+              </a:solidFill>
+              <a:latin typeface="Cascadia Code SemiBold" panose="020B0609020000020004" pitchFamily="49" charset="0"/>
+              <a:ea typeface="Cascadia Code SemiBold" panose="020B0609020000020004" pitchFamily="49" charset="0"/>
+              <a:cs typeface="Cascadia Code SemiBold" panose="020B0609020000020004" pitchFamily="49" charset="0"/>
+            </a:endParaRPr>
+          </a:p>
+        </p:txBody>
+      </p:sp>
+      <p:sp>
+        <p:nvSpPr>
+          <p:cNvPr id="3" name="Subtitle 2">
+            <a:extLst>
+              <a:ext uri="{FF2B5EF4-FFF2-40B4-BE49-F238E27FC236}">
+                <a16:creationId xmlns:a16="http://schemas.microsoft.com/office/drawing/2014/main" id="{D006C8C8-3712-034B-F68E-BF266CFED071}"/>
+              </a:ext>
+            </a:extLst>
+          </p:cNvPr>
+          <p:cNvSpPr>
+            <a:spLocks noGrp="1"/>
+          </p:cNvSpPr>
+          <p:nvPr>
+            <p:ph type="subTitle" idx="1"/>
+          </p:nvPr>
+        </p:nvSpPr>
+        <p:spPr>
+          <a:xfrm>
+            <a:off x="509228" y="1363482"/>
+            <a:ext cx="11070674" cy="5113330"/>
+          </a:xfrm>
+        </p:spPr>
+        <p:txBody>
+          <a:bodyPr>
+            <a:normAutofit/>
+          </a:bodyPr>
+          <a:lstStyle/>
+          <a:p>
+            <a:r>
+              <a:rPr lang="en-US" sz="4000" dirty="0">
+                <a:solidFill>
+                  <a:srgbClr val="EEEEEE"/>
+                </a:solidFill>
+                <a:latin typeface="Cascadia Code" panose="020B0609020000020004" pitchFamily="49" charset="0"/>
+                <a:ea typeface="Cascadia Code" panose="020B0609020000020004" pitchFamily="49" charset="0"/>
+                <a:cs typeface="Cascadia Code" panose="020B0609020000020004" pitchFamily="49" charset="0"/>
+              </a:rPr>
+              <a:t>GreenVolt is an online platform dedicated to promoting renewable energy adoption and fostering connections within the green energy community. It offers a variety of features to educate, facilitate, and empower individuals and organizations in their transition to renewable energy sources.</a:t>
+            </a:r>
+          </a:p>
+        </p:txBody>
+      </p:sp>
+      <p:pic>
+        <p:nvPicPr>
+          <p:cNvPr id="5" name="Graphic 4">
+            <a:extLst>
+              <a:ext uri="{FF2B5EF4-FFF2-40B4-BE49-F238E27FC236}">
+                <a16:creationId xmlns:a16="http://schemas.microsoft.com/office/drawing/2014/main" id="{A4BCB70E-E00F-89BB-D7AB-2C0D654A7F8C}"/>
+              </a:ext>
+            </a:extLst>
+          </p:cNvPr>
+          <p:cNvPicPr>
+            <a:picLocks noChangeAspect="1"/>
+          </p:cNvPicPr>
+          <p:nvPr/>
+        </p:nvPicPr>
+        <p:blipFill>
+          <a:blip r:embed="rId2">
+            <a:extLst>
+              <a:ext uri="{28A0092B-C50C-407E-A947-70E740481C1C}">
+                <a14:useLocalDpi xmlns:a14="http://schemas.microsoft.com/office/drawing/2010/main" val="0"/>
+              </a:ext>
+              <a:ext uri="{96DAC541-7B7A-43D3-8B79-37D633B846F1}">
+                <asvg:svgBlip xmlns:asvg="http://schemas.microsoft.com/office/drawing/2016/SVG/main" r:embed="rId3"/>
+              </a:ext>
+            </a:extLst>
+          </a:blip>
+          <a:stretch>
+            <a:fillRect/>
+          </a:stretch>
+        </p:blipFill>
+        <p:spPr>
+          <a:xfrm>
+            <a:off x="509228" y="228697"/>
+            <a:ext cx="982294" cy="982294"/>
+          </a:xfrm>
+          <a:prstGeom prst="rect">
+            <a:avLst/>
+          </a:prstGeom>
+        </p:spPr>
+      </p:pic>
+    </p:spTree>
+    <p:extLst>
+      <p:ext uri="{BB962C8B-B14F-4D97-AF65-F5344CB8AC3E}">
+        <p14:creationId xmlns:p14="http://schemas.microsoft.com/office/powerpoint/2010/main" val="2721715601"/>
+      </p:ext>
+    </p:extLst>
+  </p:cSld>
+  <p:clrMapOvr>
+    <a:masterClrMapping/>
+  </p:clrMapOvr>
+</p:sld>
+</file>
+
+<file path=ppt/slides/slide3.xml><?xml version="1.0" encoding="utf-8"?>
+<p:sld xmlns:a="http://schemas.openxmlformats.org/drawingml/2006/main" xmlns:r="http://schemas.openxmlformats.org/officeDocument/2006/relationships" xmlns:p="http://schemas.openxmlformats.org/presentationml/2006/main">
+  <p:cSld>
+    <p:bg>
+      <p:bgPr>
+        <a:solidFill>
+          <a:srgbClr val="212121"/>
+        </a:solidFill>
+        <a:effectLst/>
+      </p:bgPr>
+    </p:bg>
+    <p:spTree>
+      <p:nvGrpSpPr>
+        <p:cNvPr id="1" name=""/>
+        <p:cNvGrpSpPr/>
+        <p:nvPr/>
+      </p:nvGrpSpPr>
+      <p:grpSpPr>
+        <a:xfrm>
+          <a:off x="0" y="0"/>
+          <a:ext cx="0" cy="0"/>
+          <a:chOff x="0" y="0"/>
+          <a:chExt cx="0" cy="0"/>
+        </a:xfrm>
+      </p:grpSpPr>
+      <p:sp>
+        <p:nvSpPr>
+          <p:cNvPr id="2" name="Title 1">
+            <a:extLst>
+              <a:ext uri="{FF2B5EF4-FFF2-40B4-BE49-F238E27FC236}">
+                <a16:creationId xmlns:a16="http://schemas.microsoft.com/office/drawing/2014/main" id="{A48F3F0A-DD67-2A6E-99E2-36E05BCD8A85}"/>
+              </a:ext>
+            </a:extLst>
+          </p:cNvPr>
+          <p:cNvSpPr>
+            <a:spLocks noGrp="1"/>
+          </p:cNvSpPr>
+          <p:nvPr>
+            <p:ph type="ctrTitle"/>
+          </p:nvPr>
+        </p:nvSpPr>
+        <p:spPr>
+          <a:xfrm>
+            <a:off x="1491521" y="381188"/>
+            <a:ext cx="6158725" cy="677312"/>
+          </a:xfrm>
+        </p:spPr>
+        <p:txBody>
+          <a:bodyPr>
+            <a:noAutofit/>
+          </a:bodyPr>
+          <a:lstStyle/>
+          <a:p>
+            <a:r>
+              <a:rPr lang="en-US" sz="4400" dirty="0">
+                <a:solidFill>
+                  <a:srgbClr val="EEEEEE"/>
+                </a:solidFill>
+                <a:latin typeface="Cascadia Code SemiBold" panose="020B0609020000020004" pitchFamily="49" charset="0"/>
+                <a:ea typeface="Cascadia Code SemiBold" panose="020B0609020000020004" pitchFamily="49" charset="0"/>
+                <a:cs typeface="Cascadia Code SemiBold" panose="020B0609020000020004" pitchFamily="49" charset="0"/>
+              </a:rPr>
+              <a:t>Mission and Vision</a:t>
+            </a:r>
+            <a:endParaRPr lang="en-IN" sz="4400" dirty="0">
+              <a:solidFill>
+                <a:srgbClr val="EEEEEE"/>
+              </a:solidFill>
+              <a:latin typeface="Cascadia Code SemiBold" panose="020B0609020000020004" pitchFamily="49" charset="0"/>
+              <a:ea typeface="Cascadia Code SemiBold" panose="020B0609020000020004" pitchFamily="49" charset="0"/>
+              <a:cs typeface="Cascadia Code SemiBold" panose="020B0609020000020004" pitchFamily="49" charset="0"/>
+            </a:endParaRPr>
+          </a:p>
+        </p:txBody>
+      </p:sp>
+      <p:sp>
+        <p:nvSpPr>
+          <p:cNvPr id="3" name="Subtitle 2">
+            <a:extLst>
+              <a:ext uri="{FF2B5EF4-FFF2-40B4-BE49-F238E27FC236}">
+                <a16:creationId xmlns:a16="http://schemas.microsoft.com/office/drawing/2014/main" id="{D006C8C8-3712-034B-F68E-BF266CFED071}"/>
+              </a:ext>
+            </a:extLst>
+          </p:cNvPr>
+          <p:cNvSpPr>
+            <a:spLocks noGrp="1"/>
+          </p:cNvSpPr>
+          <p:nvPr>
+            <p:ph type="subTitle" idx="1"/>
+          </p:nvPr>
+        </p:nvSpPr>
+        <p:spPr>
+          <a:xfrm>
+            <a:off x="509228" y="1363482"/>
+            <a:ext cx="11070674" cy="5113330"/>
+          </a:xfrm>
+        </p:spPr>
+        <p:txBody>
+          <a:bodyPr>
+            <a:normAutofit/>
+          </a:bodyPr>
+          <a:lstStyle/>
+          <a:p>
+            <a:r>
+              <a:rPr lang="en-US" sz="4400" dirty="0">
+                <a:solidFill>
+                  <a:srgbClr val="EEEEEE"/>
+                </a:solidFill>
+                <a:latin typeface="Cascadia Code" panose="020B0609020000020004" pitchFamily="49" charset="0"/>
+                <a:ea typeface="Cascadia Code" panose="020B0609020000020004" pitchFamily="49" charset="0"/>
+                <a:cs typeface="Cascadia Code" panose="020B0609020000020004" pitchFamily="49" charset="0"/>
+              </a:rPr>
+              <a:t>Our mission and vision is to create an environment where everyone can learn more about green energy alternatives and buy these alternatives and one day completely remove all the carbon footprints from the world.</a:t>
+            </a:r>
+            <a:endParaRPr lang="en-IN" sz="4400" dirty="0">
+              <a:solidFill>
+                <a:srgbClr val="EEEEEE"/>
+              </a:solidFill>
+              <a:latin typeface="Cascadia Code" panose="020B0609020000020004" pitchFamily="49" charset="0"/>
+              <a:ea typeface="Cascadia Code" panose="020B0609020000020004" pitchFamily="49" charset="0"/>
+              <a:cs typeface="Cascadia Code" panose="020B0609020000020004" pitchFamily="49" charset="0"/>
+            </a:endParaRPr>
+          </a:p>
+        </p:txBody>
+      </p:sp>
+      <p:pic>
+        <p:nvPicPr>
+          <p:cNvPr id="5" name="Graphic 4">
+            <a:extLst>
+              <a:ext uri="{FF2B5EF4-FFF2-40B4-BE49-F238E27FC236}">
+                <a16:creationId xmlns:a16="http://schemas.microsoft.com/office/drawing/2014/main" id="{A4BCB70E-E00F-89BB-D7AB-2C0D654A7F8C}"/>
+              </a:ext>
+            </a:extLst>
+          </p:cNvPr>
+          <p:cNvPicPr>
+            <a:picLocks noChangeAspect="1"/>
+          </p:cNvPicPr>
+          <p:nvPr/>
+        </p:nvPicPr>
+        <p:blipFill>
+          <a:blip r:embed="rId3">
+            <a:extLst>
+              <a:ext uri="{28A0092B-C50C-407E-A947-70E740481C1C}">
+                <a14:useLocalDpi xmlns:a14="http://schemas.microsoft.com/office/drawing/2010/main" val="0"/>
+              </a:ext>
+              <a:ext uri="{96DAC541-7B7A-43D3-8B79-37D633B846F1}">
+                <asvg:svgBlip xmlns:asvg="http://schemas.microsoft.com/office/drawing/2016/SVG/main" r:embed="rId4"/>
+              </a:ext>
+            </a:extLst>
+          </a:blip>
+          <a:stretch>
+            <a:fillRect/>
+          </a:stretch>
+        </p:blipFill>
+        <p:spPr>
+          <a:xfrm>
+            <a:off x="509228" y="228697"/>
+            <a:ext cx="982294" cy="982294"/>
+          </a:xfrm>
+          <a:prstGeom prst="rect">
+            <a:avLst/>
+          </a:prstGeom>
+        </p:spPr>
+      </p:pic>
+    </p:spTree>
+    <p:extLst>
+      <p:ext uri="{BB962C8B-B14F-4D97-AF65-F5344CB8AC3E}">
+        <p14:creationId xmlns:p14="http://schemas.microsoft.com/office/powerpoint/2010/main" val="2393507847"/>
+      </p:ext>
+    </p:extLst>
+  </p:cSld>
+  <p:clrMapOvr>
+    <a:masterClrMapping/>
+  </p:clrMapOvr>
+</p:sld>
+</file>
+
+<file path=ppt/slides/slide4.xml><?xml version="1.0" encoding="utf-8"?>
+<p:sld xmlns:a="http://schemas.openxmlformats.org/drawingml/2006/main" xmlns:r="http://schemas.openxmlformats.org/officeDocument/2006/relationships" xmlns:p="http://schemas.openxmlformats.org/presentationml/2006/main">
+  <p:cSld>
+    <p:bg>
+      <p:bgPr>
+        <a:solidFill>
+          <a:srgbClr val="212121"/>
+        </a:solidFill>
+        <a:effectLst/>
+      </p:bgPr>
+    </p:bg>
+    <p:spTree>
+      <p:nvGrpSpPr>
+        <p:cNvPr id="1" name=""/>
+        <p:cNvGrpSpPr/>
+        <p:nvPr/>
+      </p:nvGrpSpPr>
+      <p:grpSpPr>
+        <a:xfrm>
+          <a:off x="0" y="0"/>
+          <a:ext cx="0" cy="0"/>
+          <a:chOff x="0" y="0"/>
+          <a:chExt cx="0" cy="0"/>
+        </a:xfrm>
+      </p:grpSpPr>
+      <p:sp>
+        <p:nvSpPr>
+          <p:cNvPr id="2" name="Title 1">
+            <a:extLst>
+              <a:ext uri="{FF2B5EF4-FFF2-40B4-BE49-F238E27FC236}">
+                <a16:creationId xmlns:a16="http://schemas.microsoft.com/office/drawing/2014/main" id="{A48F3F0A-DD67-2A6E-99E2-36E05BCD8A85}"/>
+              </a:ext>
+            </a:extLst>
+          </p:cNvPr>
+          <p:cNvSpPr>
+            <a:spLocks noGrp="1"/>
+          </p:cNvSpPr>
+          <p:nvPr>
+            <p:ph type="ctrTitle"/>
+          </p:nvPr>
+        </p:nvSpPr>
+        <p:spPr>
+          <a:xfrm>
+            <a:off x="1491521" y="381188"/>
+            <a:ext cx="6158725" cy="677312"/>
+          </a:xfrm>
+        </p:spPr>
+        <p:txBody>
+          <a:bodyPr>
+            <a:noAutofit/>
+          </a:bodyPr>
+          <a:lstStyle/>
+          <a:p>
+            <a:r>
+              <a:rPr lang="en-US" sz="4400" dirty="0">
+                <a:solidFill>
+                  <a:srgbClr val="EEEEEE"/>
+                </a:solidFill>
+                <a:latin typeface="Cascadia Code SemiBold" panose="020B0609020000020004" pitchFamily="49" charset="0"/>
+                <a:ea typeface="Cascadia Code SemiBold" panose="020B0609020000020004" pitchFamily="49" charset="0"/>
+                <a:cs typeface="Cascadia Code SemiBold" panose="020B0609020000020004" pitchFamily="49" charset="0"/>
+              </a:rPr>
+              <a:t>Market Opportunity</a:t>
+            </a:r>
+            <a:endParaRPr lang="en-IN" sz="4400" dirty="0">
+              <a:solidFill>
+                <a:srgbClr val="EEEEEE"/>
+              </a:solidFill>
+              <a:latin typeface="Cascadia Code SemiBold" panose="020B0609020000020004" pitchFamily="49" charset="0"/>
+              <a:ea typeface="Cascadia Code SemiBold" panose="020B0609020000020004" pitchFamily="49" charset="0"/>
+              <a:cs typeface="Cascadia Code SemiBold" panose="020B0609020000020004" pitchFamily="49" charset="0"/>
+            </a:endParaRPr>
+          </a:p>
+        </p:txBody>
+      </p:sp>
+      <p:sp>
+        <p:nvSpPr>
+          <p:cNvPr id="3" name="Subtitle 2">
+            <a:extLst>
+              <a:ext uri="{FF2B5EF4-FFF2-40B4-BE49-F238E27FC236}">
+                <a16:creationId xmlns:a16="http://schemas.microsoft.com/office/drawing/2014/main" id="{D006C8C8-3712-034B-F68E-BF266CFED071}"/>
+              </a:ext>
+            </a:extLst>
+          </p:cNvPr>
+          <p:cNvSpPr>
+            <a:spLocks noGrp="1"/>
+          </p:cNvSpPr>
+          <p:nvPr>
+            <p:ph type="subTitle" idx="1"/>
+          </p:nvPr>
+        </p:nvSpPr>
+        <p:spPr>
+          <a:xfrm>
+            <a:off x="509228" y="1363482"/>
+            <a:ext cx="11070674" cy="5113330"/>
+          </a:xfrm>
+        </p:spPr>
+        <p:txBody>
+          <a:bodyPr>
+            <a:normAutofit fontScale="92500"/>
+          </a:bodyPr>
+          <a:lstStyle/>
+          <a:p>
+            <a:r>
+              <a:rPr lang="en-US" sz="6000" dirty="0">
+                <a:solidFill>
+                  <a:srgbClr val="EEEEEE"/>
+                </a:solidFill>
+                <a:latin typeface="Cascadia Code" panose="020B0609020000020004" pitchFamily="49" charset="0"/>
+                <a:ea typeface="Cascadia Code" panose="020B0609020000020004" pitchFamily="49" charset="0"/>
+                <a:cs typeface="Cascadia Code" panose="020B0609020000020004" pitchFamily="49" charset="0"/>
+              </a:rPr>
+              <a:t>GreenVolt is the one of the only source out there which provides educational content as well as the extensive marketplace for buyers and sellers.</a:t>
+            </a:r>
+            <a:endParaRPr lang="en-IN" sz="6000" dirty="0">
+              <a:solidFill>
+                <a:srgbClr val="EEEEEE"/>
+              </a:solidFill>
+              <a:latin typeface="Cascadia Code" panose="020B0609020000020004" pitchFamily="49" charset="0"/>
+              <a:ea typeface="Cascadia Code" panose="020B0609020000020004" pitchFamily="49" charset="0"/>
+              <a:cs typeface="Cascadia Code" panose="020B0609020000020004" pitchFamily="49" charset="0"/>
+            </a:endParaRPr>
+          </a:p>
+        </p:txBody>
+      </p:sp>
+      <p:pic>
+        <p:nvPicPr>
+          <p:cNvPr id="5" name="Graphic 4">
+            <a:extLst>
+              <a:ext uri="{FF2B5EF4-FFF2-40B4-BE49-F238E27FC236}">
+                <a16:creationId xmlns:a16="http://schemas.microsoft.com/office/drawing/2014/main" id="{A4BCB70E-E00F-89BB-D7AB-2C0D654A7F8C}"/>
+              </a:ext>
+            </a:extLst>
+          </p:cNvPr>
+          <p:cNvPicPr>
+            <a:picLocks noChangeAspect="1"/>
+          </p:cNvPicPr>
+          <p:nvPr/>
+        </p:nvPicPr>
+        <p:blipFill>
+          <a:blip r:embed="rId3">
+            <a:extLst>
+              <a:ext uri="{28A0092B-C50C-407E-A947-70E740481C1C}">
+                <a14:useLocalDpi xmlns:a14="http://schemas.microsoft.com/office/drawing/2010/main" val="0"/>
+              </a:ext>
+              <a:ext uri="{96DAC541-7B7A-43D3-8B79-37D633B846F1}">
+                <asvg:svgBlip xmlns:asvg="http://schemas.microsoft.com/office/drawing/2016/SVG/main" r:embed="rId4"/>
+              </a:ext>
+            </a:extLst>
+          </a:blip>
+          <a:stretch>
+            <a:fillRect/>
+          </a:stretch>
+        </p:blipFill>
+        <p:spPr>
+          <a:xfrm>
+            <a:off x="509228" y="228697"/>
+            <a:ext cx="982294" cy="982294"/>
+          </a:xfrm>
+          <a:prstGeom prst="rect">
+            <a:avLst/>
+          </a:prstGeom>
+        </p:spPr>
+      </p:pic>
+    </p:spTree>
+    <p:extLst>
+      <p:ext uri="{BB962C8B-B14F-4D97-AF65-F5344CB8AC3E}">
+        <p14:creationId xmlns:p14="http://schemas.microsoft.com/office/powerpoint/2010/main" val="3024300037"/>
+      </p:ext>
+    </p:extLst>
+  </p:cSld>
+  <p:clrMapOvr>
+    <a:masterClrMapping/>
+  </p:clrMapOvr>
+</p:sld>
+</file>
+
+<file path=ppt/slides/slide5.xml><?xml version="1.0" encoding="utf-8"?>
+<p:sld xmlns:a="http://schemas.openxmlformats.org/drawingml/2006/main" xmlns:r="http://schemas.openxmlformats.org/officeDocument/2006/relationships" xmlns:p="http://schemas.openxmlformats.org/presentationml/2006/main">
+  <p:cSld>
+    <p:bg>
+      <p:bgPr>
+        <a:solidFill>
+          <a:srgbClr val="212121"/>
+        </a:solidFill>
+        <a:effectLst/>
+      </p:bgPr>
+    </p:bg>
+    <p:spTree>
+      <p:nvGrpSpPr>
+        <p:cNvPr id="1" name=""/>
+        <p:cNvGrpSpPr/>
+        <p:nvPr/>
+      </p:nvGrpSpPr>
+      <p:grpSpPr>
+        <a:xfrm>
+          <a:off x="0" y="0"/>
+          <a:ext cx="0" cy="0"/>
+          <a:chOff x="0" y="0"/>
+          <a:chExt cx="0" cy="0"/>
+        </a:xfrm>
+      </p:grpSpPr>
+      <p:sp>
+        <p:nvSpPr>
+          <p:cNvPr id="2" name="Title 1">
+            <a:extLst>
+              <a:ext uri="{FF2B5EF4-FFF2-40B4-BE49-F238E27FC236}">
+                <a16:creationId xmlns:a16="http://schemas.microsoft.com/office/drawing/2014/main" id="{A48F3F0A-DD67-2A6E-99E2-36E05BCD8A85}"/>
+              </a:ext>
+            </a:extLst>
+          </p:cNvPr>
+          <p:cNvSpPr>
+            <a:spLocks noGrp="1"/>
+          </p:cNvSpPr>
+          <p:nvPr>
+            <p:ph type="ctrTitle"/>
+          </p:nvPr>
+        </p:nvSpPr>
+        <p:spPr>
+          <a:xfrm>
+            <a:off x="1491522" y="381188"/>
+            <a:ext cx="4818536" cy="677312"/>
+          </a:xfrm>
+        </p:spPr>
+        <p:txBody>
+          <a:bodyPr>
+            <a:noAutofit/>
+          </a:bodyPr>
+          <a:lstStyle/>
+          <a:p>
+            <a:r>
+              <a:rPr lang="en-US" sz="4400" dirty="0">
+                <a:solidFill>
+                  <a:srgbClr val="EEEEEE"/>
+                </a:solidFill>
+                <a:latin typeface="Cascadia Code SemiBold" panose="020B0609020000020004" pitchFamily="49" charset="0"/>
+                <a:ea typeface="Cascadia Code SemiBold" panose="020B0609020000020004" pitchFamily="49" charset="0"/>
+                <a:cs typeface="Cascadia Code SemiBold" panose="020B0609020000020004" pitchFamily="49" charset="0"/>
+              </a:rPr>
+              <a:t>Business Model</a:t>
+            </a:r>
+            <a:endParaRPr lang="en-IN" sz="4400" dirty="0">
+              <a:solidFill>
+                <a:srgbClr val="EEEEEE"/>
+              </a:solidFill>
+              <a:latin typeface="Cascadia Code SemiBold" panose="020B0609020000020004" pitchFamily="49" charset="0"/>
+              <a:ea typeface="Cascadia Code SemiBold" panose="020B0609020000020004" pitchFamily="49" charset="0"/>
+              <a:cs typeface="Cascadia Code SemiBold" panose="020B0609020000020004" pitchFamily="49" charset="0"/>
+            </a:endParaRPr>
+          </a:p>
+        </p:txBody>
+      </p:sp>
+      <p:sp>
+        <p:nvSpPr>
+          <p:cNvPr id="3" name="Subtitle 2">
+            <a:extLst>
+              <a:ext uri="{FF2B5EF4-FFF2-40B4-BE49-F238E27FC236}">
+                <a16:creationId xmlns:a16="http://schemas.microsoft.com/office/drawing/2014/main" id="{D006C8C8-3712-034B-F68E-BF266CFED071}"/>
+              </a:ext>
+            </a:extLst>
+          </p:cNvPr>
+          <p:cNvSpPr>
+            <a:spLocks noGrp="1"/>
+          </p:cNvSpPr>
+          <p:nvPr>
+            <p:ph type="subTitle" idx="1"/>
+          </p:nvPr>
+        </p:nvSpPr>
+        <p:spPr>
+          <a:xfrm>
+            <a:off x="509228" y="1363482"/>
+            <a:ext cx="11070674" cy="5113330"/>
+          </a:xfrm>
+        </p:spPr>
+        <p:txBody>
+          <a:bodyPr>
+            <a:normAutofit fontScale="92500"/>
+          </a:bodyPr>
+          <a:lstStyle/>
+          <a:p>
+            <a:r>
+              <a:rPr lang="en-US" sz="6000" dirty="0">
+                <a:solidFill>
+                  <a:srgbClr val="EEEEEE"/>
+                </a:solidFill>
+                <a:latin typeface="Cascadia Code" panose="020B0609020000020004" pitchFamily="49" charset="0"/>
+                <a:ea typeface="Cascadia Code" panose="020B0609020000020004" pitchFamily="49" charset="0"/>
+                <a:cs typeface="Cascadia Code" panose="020B0609020000020004" pitchFamily="49" charset="0"/>
+              </a:rPr>
+              <a:t>GreenVolt earns money from ads, sponsorships, user donations, Marketplace Transactions, blog monetization and much more!</a:t>
+            </a:r>
+            <a:endParaRPr lang="en-IN" sz="6000" dirty="0">
+              <a:solidFill>
+                <a:srgbClr val="EEEEEE"/>
+              </a:solidFill>
+              <a:latin typeface="Cascadia Code" panose="020B0609020000020004" pitchFamily="49" charset="0"/>
+              <a:ea typeface="Cascadia Code" panose="020B0609020000020004" pitchFamily="49" charset="0"/>
+              <a:cs typeface="Cascadia Code" panose="020B0609020000020004" pitchFamily="49" charset="0"/>
+            </a:endParaRPr>
+          </a:p>
+        </p:txBody>
+      </p:sp>
+      <p:pic>
+        <p:nvPicPr>
+          <p:cNvPr id="5" name="Graphic 4">
+            <a:extLst>
+              <a:ext uri="{FF2B5EF4-FFF2-40B4-BE49-F238E27FC236}">
+                <a16:creationId xmlns:a16="http://schemas.microsoft.com/office/drawing/2014/main" id="{A4BCB70E-E00F-89BB-D7AB-2C0D654A7F8C}"/>
+              </a:ext>
+            </a:extLst>
+          </p:cNvPr>
+          <p:cNvPicPr>
+            <a:picLocks noChangeAspect="1"/>
+          </p:cNvPicPr>
+          <p:nvPr/>
+        </p:nvPicPr>
+        <p:blipFill>
+          <a:blip r:embed="rId3">
+            <a:extLst>
+              <a:ext uri="{28A0092B-C50C-407E-A947-70E740481C1C}">
+                <a14:useLocalDpi xmlns:a14="http://schemas.microsoft.com/office/drawing/2010/main" val="0"/>
+              </a:ext>
+              <a:ext uri="{96DAC541-7B7A-43D3-8B79-37D633B846F1}">
+                <asvg:svgBlip xmlns:asvg="http://schemas.microsoft.com/office/drawing/2016/SVG/main" r:embed="rId4"/>
+              </a:ext>
+            </a:extLst>
+          </a:blip>
+          <a:stretch>
+            <a:fillRect/>
+          </a:stretch>
+        </p:blipFill>
+        <p:spPr>
+          <a:xfrm>
+            <a:off x="509228" y="228697"/>
+            <a:ext cx="982294" cy="982294"/>
+          </a:xfrm>
+          <a:prstGeom prst="rect">
+            <a:avLst/>
+          </a:prstGeom>
+        </p:spPr>
+      </p:pic>
+    </p:spTree>
+    <p:extLst>
+      <p:ext uri="{BB962C8B-B14F-4D97-AF65-F5344CB8AC3E}">
+        <p14:creationId xmlns:p14="http://schemas.microsoft.com/office/powerpoint/2010/main" val="893436147"/>
+      </p:ext>
+    </p:extLst>
+  </p:cSld>
+  <p:clrMapOvr>
+    <a:masterClrMapping/>
+  </p:clrMapOvr>
+</p:sld>
+</file>
+
+<file path=ppt/slides/slide6.xml><?xml version="1.0" encoding="utf-8"?>
+<p:sld xmlns:a="http://schemas.openxmlformats.org/drawingml/2006/main" xmlns:r="http://schemas.openxmlformats.org/officeDocument/2006/relationships" xmlns:p="http://schemas.openxmlformats.org/presentationml/2006/main">
+  <p:cSld>
+    <p:bg>
+      <p:bgPr>
+        <a:solidFill>
+          <a:srgbClr val="212121"/>
+        </a:solidFill>
+        <a:effectLst/>
+      </p:bgPr>
+    </p:bg>
+    <p:spTree>
+      <p:nvGrpSpPr>
+        <p:cNvPr id="1" name=""/>
+        <p:cNvGrpSpPr/>
+        <p:nvPr/>
+      </p:nvGrpSpPr>
+      <p:grpSpPr>
+        <a:xfrm>
+          <a:off x="0" y="0"/>
+          <a:ext cx="0" cy="0"/>
+          <a:chOff x="0" y="0"/>
+          <a:chExt cx="0" cy="0"/>
+        </a:xfrm>
+      </p:grpSpPr>
+      <p:sp>
+        <p:nvSpPr>
+          <p:cNvPr id="2" name="Title 1">
+            <a:extLst>
+              <a:ext uri="{FF2B5EF4-FFF2-40B4-BE49-F238E27FC236}">
+                <a16:creationId xmlns:a16="http://schemas.microsoft.com/office/drawing/2014/main" id="{A48F3F0A-DD67-2A6E-99E2-36E05BCD8A85}"/>
+              </a:ext>
+            </a:extLst>
+          </p:cNvPr>
+          <p:cNvSpPr>
+            <a:spLocks noGrp="1"/>
+          </p:cNvSpPr>
+          <p:nvPr>
+            <p:ph type="ctrTitle"/>
+          </p:nvPr>
+        </p:nvSpPr>
+        <p:spPr>
+          <a:xfrm>
+            <a:off x="1491521" y="381188"/>
+            <a:ext cx="5865559" cy="677312"/>
+          </a:xfrm>
+        </p:spPr>
+        <p:txBody>
+          <a:bodyPr>
+            <a:noAutofit/>
+          </a:bodyPr>
+          <a:lstStyle/>
+          <a:p>
+            <a:r>
+              <a:rPr lang="en-US" sz="4400" dirty="0">
+                <a:solidFill>
+                  <a:srgbClr val="EEEEEE"/>
+                </a:solidFill>
+                <a:latin typeface="Cascadia Code SemiBold" panose="020B0609020000020004" pitchFamily="49" charset="0"/>
+                <a:ea typeface="Cascadia Code SemiBold" panose="020B0609020000020004" pitchFamily="49" charset="0"/>
+                <a:cs typeface="Cascadia Code SemiBold" panose="020B0609020000020004" pitchFamily="49" charset="0"/>
+              </a:rPr>
+              <a:t>Technical Details</a:t>
+            </a:r>
+            <a:endParaRPr lang="en-IN" sz="4400" dirty="0">
+              <a:solidFill>
+                <a:srgbClr val="EEEEEE"/>
+              </a:solidFill>
+              <a:latin typeface="Cascadia Code SemiBold" panose="020B0609020000020004" pitchFamily="49" charset="0"/>
+              <a:ea typeface="Cascadia Code SemiBold" panose="020B0609020000020004" pitchFamily="49" charset="0"/>
+              <a:cs typeface="Cascadia Code SemiBold" panose="020B0609020000020004" pitchFamily="49" charset="0"/>
+            </a:endParaRPr>
+          </a:p>
+        </p:txBody>
+      </p:sp>
+      <p:sp>
+        <p:nvSpPr>
+          <p:cNvPr id="3" name="Subtitle 2">
+            <a:extLst>
+              <a:ext uri="{FF2B5EF4-FFF2-40B4-BE49-F238E27FC236}">
+                <a16:creationId xmlns:a16="http://schemas.microsoft.com/office/drawing/2014/main" id="{D006C8C8-3712-034B-F68E-BF266CFED071}"/>
+              </a:ext>
+            </a:extLst>
+          </p:cNvPr>
+          <p:cNvSpPr>
+            <a:spLocks noGrp="1"/>
+          </p:cNvSpPr>
+          <p:nvPr>
+            <p:ph type="subTitle" idx="1"/>
+          </p:nvPr>
+        </p:nvSpPr>
+        <p:spPr>
+          <a:xfrm>
+            <a:off x="509228" y="1363482"/>
+            <a:ext cx="11070674" cy="5113330"/>
+          </a:xfrm>
+        </p:spPr>
+        <p:txBody>
+          <a:bodyPr>
+            <a:normAutofit/>
+          </a:bodyPr>
+          <a:lstStyle/>
+          <a:p>
+            <a:pPr algn="l"/>
+            <a:r>
+              <a:rPr lang="en-US" dirty="0">
+                <a:solidFill>
+                  <a:srgbClr val="EEEEEE"/>
+                </a:solidFill>
+                <a:latin typeface="Cascadia Code" panose="020B0609020000020004" pitchFamily="49" charset="0"/>
+                <a:ea typeface="Cascadia Code" panose="020B0609020000020004" pitchFamily="49" charset="0"/>
+                <a:cs typeface="Cascadia Code" panose="020B0609020000020004" pitchFamily="49" charset="0"/>
+              </a:rPr>
+              <a:t>Language used for back-end: Python</a:t>
+            </a:r>
+          </a:p>
+          <a:p>
+            <a:pPr algn="l"/>
+            <a:endParaRPr lang="en-US" dirty="0">
+              <a:solidFill>
+                <a:srgbClr val="EEEEEE"/>
+              </a:solidFill>
+              <a:latin typeface="Cascadia Code" panose="020B0609020000020004" pitchFamily="49" charset="0"/>
+              <a:ea typeface="Cascadia Code" panose="020B0609020000020004" pitchFamily="49" charset="0"/>
+              <a:cs typeface="Cascadia Code" panose="020B0609020000020004" pitchFamily="49" charset="0"/>
+            </a:endParaRPr>
+          </a:p>
+          <a:p>
+            <a:pPr algn="l"/>
+            <a:r>
+              <a:rPr lang="en-US" dirty="0">
+                <a:solidFill>
+                  <a:srgbClr val="EEEEEE"/>
+                </a:solidFill>
+                <a:latin typeface="Cascadia Code" panose="020B0609020000020004" pitchFamily="49" charset="0"/>
+                <a:ea typeface="Cascadia Code" panose="020B0609020000020004" pitchFamily="49" charset="0"/>
+                <a:cs typeface="Cascadia Code" panose="020B0609020000020004" pitchFamily="49" charset="0"/>
+              </a:rPr>
+              <a:t>Back-end Libraries: FastAPI, Jinja2, Markdown, motor, pymongo, uvicorn, </a:t>
+            </a:r>
+            <a:r>
+              <a:rPr lang="en-US" dirty="0" err="1">
+                <a:solidFill>
+                  <a:srgbClr val="EEEEEE"/>
+                </a:solidFill>
+                <a:latin typeface="Cascadia Code" panose="020B0609020000020004" pitchFamily="49" charset="0"/>
+                <a:ea typeface="Cascadia Code" panose="020B0609020000020004" pitchFamily="49" charset="0"/>
+                <a:cs typeface="Cascadia Code" panose="020B0609020000020004" pitchFamily="49" charset="0"/>
+              </a:rPr>
+              <a:t>dnspython</a:t>
+            </a:r>
+            <a:r>
+              <a:rPr lang="en-US" dirty="0">
+                <a:solidFill>
+                  <a:srgbClr val="EEEEEE"/>
+                </a:solidFill>
+                <a:latin typeface="Cascadia Code" panose="020B0609020000020004" pitchFamily="49" charset="0"/>
+                <a:ea typeface="Cascadia Code" panose="020B0609020000020004" pitchFamily="49" charset="0"/>
+                <a:cs typeface="Cascadia Code" panose="020B0609020000020004" pitchFamily="49" charset="0"/>
+              </a:rPr>
+              <a:t>. </a:t>
+            </a:r>
+          </a:p>
+          <a:p>
+            <a:pPr algn="l"/>
+            <a:endParaRPr lang="en-US" dirty="0">
+              <a:solidFill>
+                <a:srgbClr val="EEEEEE"/>
+              </a:solidFill>
+              <a:latin typeface="Cascadia Code" panose="020B0609020000020004" pitchFamily="49" charset="0"/>
+              <a:ea typeface="Cascadia Code" panose="020B0609020000020004" pitchFamily="49" charset="0"/>
+              <a:cs typeface="Cascadia Code" panose="020B0609020000020004" pitchFamily="49" charset="0"/>
+            </a:endParaRPr>
+          </a:p>
+          <a:p>
+            <a:pPr algn="l"/>
+            <a:r>
+              <a:rPr lang="en-US" dirty="0" err="1">
+                <a:solidFill>
+                  <a:srgbClr val="EEEEEE"/>
+                </a:solidFill>
+                <a:latin typeface="Cascadia Code" panose="020B0609020000020004" pitchFamily="49" charset="0"/>
+                <a:ea typeface="Cascadia Code" panose="020B0609020000020004" pitchFamily="49" charset="0"/>
+                <a:cs typeface="Cascadia Code" panose="020B0609020000020004" pitchFamily="49" charset="0"/>
+              </a:rPr>
+              <a:t>DataBase</a:t>
+            </a:r>
+            <a:r>
+              <a:rPr lang="en-US" dirty="0">
+                <a:solidFill>
+                  <a:srgbClr val="EEEEEE"/>
+                </a:solidFill>
+                <a:latin typeface="Cascadia Code" panose="020B0609020000020004" pitchFamily="49" charset="0"/>
+                <a:ea typeface="Cascadia Code" panose="020B0609020000020004" pitchFamily="49" charset="0"/>
+                <a:cs typeface="Cascadia Code" panose="020B0609020000020004" pitchFamily="49" charset="0"/>
+              </a:rPr>
+              <a:t>: MongoDB.</a:t>
+            </a:r>
+          </a:p>
+          <a:p>
+            <a:pPr algn="l"/>
+            <a:endParaRPr lang="en-US" dirty="0">
+              <a:solidFill>
+                <a:srgbClr val="EEEEEE"/>
+              </a:solidFill>
+              <a:latin typeface="Cascadia Code" panose="020B0609020000020004" pitchFamily="49" charset="0"/>
+              <a:ea typeface="Cascadia Code" panose="020B0609020000020004" pitchFamily="49" charset="0"/>
+              <a:cs typeface="Cascadia Code" panose="020B0609020000020004" pitchFamily="49" charset="0"/>
+            </a:endParaRPr>
+          </a:p>
+          <a:p>
+            <a:pPr algn="l"/>
+            <a:r>
+              <a:rPr lang="en-IN" dirty="0">
+                <a:solidFill>
+                  <a:srgbClr val="EEEEEE"/>
+                </a:solidFill>
+                <a:latin typeface="Cascadia Code" panose="020B0609020000020004" pitchFamily="49" charset="0"/>
+                <a:ea typeface="Cascadia Code" panose="020B0609020000020004" pitchFamily="49" charset="0"/>
+                <a:cs typeface="Cascadia Code" panose="020B0609020000020004" pitchFamily="49" charset="0"/>
+              </a:rPr>
+              <a:t>Front-end: HTML, CSS, JavaScript.</a:t>
+            </a:r>
+          </a:p>
+          <a:p>
+            <a:pPr algn="l"/>
+            <a:endParaRPr lang="en-IN" dirty="0">
+              <a:solidFill>
+                <a:srgbClr val="EEEEEE"/>
+              </a:solidFill>
+              <a:latin typeface="Cascadia Code" panose="020B0609020000020004" pitchFamily="49" charset="0"/>
+              <a:ea typeface="Cascadia Code" panose="020B0609020000020004" pitchFamily="49" charset="0"/>
+              <a:cs typeface="Cascadia Code" panose="020B0609020000020004" pitchFamily="49" charset="0"/>
+            </a:endParaRPr>
+          </a:p>
+          <a:p>
+            <a:pPr algn="l"/>
+            <a:r>
+              <a:rPr lang="en-IN" dirty="0">
+                <a:solidFill>
+                  <a:srgbClr val="EEEEEE"/>
+                </a:solidFill>
+                <a:latin typeface="Cascadia Code" panose="020B0609020000020004" pitchFamily="49" charset="0"/>
+                <a:ea typeface="Cascadia Code" panose="020B0609020000020004" pitchFamily="49" charset="0"/>
+                <a:cs typeface="Cascadia Code" panose="020B0609020000020004" pitchFamily="49" charset="0"/>
+              </a:rPr>
+              <a:t>Front-end Frameworks: TailwindCSS, typography.</a:t>
+            </a:r>
+          </a:p>
+        </p:txBody>
+      </p:sp>
+      <p:pic>
+        <p:nvPicPr>
+          <p:cNvPr id="5" name="Graphic 4">
+            <a:extLst>
+              <a:ext uri="{FF2B5EF4-FFF2-40B4-BE49-F238E27FC236}">
+                <a16:creationId xmlns:a16="http://schemas.microsoft.com/office/drawing/2014/main" id="{A4BCB70E-E00F-89BB-D7AB-2C0D654A7F8C}"/>
+              </a:ext>
+            </a:extLst>
+          </p:cNvPr>
+          <p:cNvPicPr>
+            <a:picLocks noChangeAspect="1"/>
+          </p:cNvPicPr>
+          <p:nvPr/>
+        </p:nvPicPr>
+        <p:blipFill>
+          <a:blip r:embed="rId2">
+            <a:extLst>
+              <a:ext uri="{28A0092B-C50C-407E-A947-70E740481C1C}">
+                <a14:useLocalDpi xmlns:a14="http://schemas.microsoft.com/office/drawing/2010/main" val="0"/>
+              </a:ext>
+              <a:ext uri="{96DAC541-7B7A-43D3-8B79-37D633B846F1}">
+                <asvg:svgBlip xmlns:asvg="http://schemas.microsoft.com/office/drawing/2016/SVG/main" r:embed="rId3"/>
+              </a:ext>
+            </a:extLst>
+          </a:blip>
+          <a:stretch>
+            <a:fillRect/>
+          </a:stretch>
+        </p:blipFill>
+        <p:spPr>
+          <a:xfrm>
+            <a:off x="509228" y="228697"/>
+            <a:ext cx="982294" cy="982294"/>
+          </a:xfrm>
+          <a:prstGeom prst="rect">
+            <a:avLst/>
+          </a:prstGeom>
+        </p:spPr>
+      </p:pic>
+      <p:pic>
+        <p:nvPicPr>
+          <p:cNvPr id="6" name="Picture 5">
+            <a:extLst>
+              <a:ext uri="{FF2B5EF4-FFF2-40B4-BE49-F238E27FC236}">
+                <a16:creationId xmlns:a16="http://schemas.microsoft.com/office/drawing/2014/main" id="{3E093492-85BE-75A2-A506-8C51112B747C}"/>
+              </a:ext>
+            </a:extLst>
+          </p:cNvPr>
+          <p:cNvPicPr>
+            <a:picLocks noChangeAspect="1"/>
+          </p:cNvPicPr>
+          <p:nvPr/>
+        </p:nvPicPr>
+        <p:blipFill>
+          <a:blip r:embed="rId4">
+            <a:extLst>
+              <a:ext uri="{28A0092B-C50C-407E-A947-70E740481C1C}">
+                <a14:useLocalDpi xmlns:a14="http://schemas.microsoft.com/office/drawing/2010/main" val="0"/>
+              </a:ext>
+            </a:extLst>
+          </a:blip>
+          <a:stretch>
+            <a:fillRect/>
+          </a:stretch>
+        </p:blipFill>
+        <p:spPr>
+          <a:xfrm>
+            <a:off x="9151504" y="3047674"/>
+            <a:ext cx="4856795" cy="5321945"/>
+          </a:xfrm>
+          <a:prstGeom prst="rect">
+            <a:avLst/>
+          </a:prstGeom>
+        </p:spPr>
+      </p:pic>
+    </p:spTree>
+    <p:extLst>
+      <p:ext uri="{BB962C8B-B14F-4D97-AF65-F5344CB8AC3E}">
+        <p14:creationId xmlns:p14="http://schemas.microsoft.com/office/powerpoint/2010/main" val="3109627651"/>
+      </p:ext>
+    </p:extLst>
+  </p:cSld>
+  <p:clrMapOvr>
+    <a:masterClrMapping/>
+  </p:clrMapOvr>
+</p:sld>
+</file>
+
+<file path=ppt/slides/slide7.xml><?xml version="1.0" encoding="utf-8"?>
+<p:sld xmlns:a="http://schemas.openxmlformats.org/drawingml/2006/main" xmlns:r="http://schemas.openxmlformats.org/officeDocument/2006/relationships" xmlns:p="http://schemas.openxmlformats.org/presentationml/2006/main">
+  <p:cSld>
+    <p:bg>
+      <p:bgPr>
+        <a:solidFill>
+          <a:srgbClr val="212121"/>
+        </a:solidFill>
+        <a:effectLst/>
+      </p:bgPr>
+    </p:bg>
+    <p:spTree>
+      <p:nvGrpSpPr>
+        <p:cNvPr id="1" name=""/>
+        <p:cNvGrpSpPr/>
+        <p:nvPr/>
+      </p:nvGrpSpPr>
+      <p:grpSpPr>
+        <a:xfrm>
+          <a:off x="0" y="0"/>
+          <a:ext cx="0" cy="0"/>
+          <a:chOff x="0" y="0"/>
+          <a:chExt cx="0" cy="0"/>
+        </a:xfrm>
+      </p:grpSpPr>
+      <p:sp>
+        <p:nvSpPr>
+          <p:cNvPr id="2" name="Title 1">
+            <a:extLst>
+              <a:ext uri="{FF2B5EF4-FFF2-40B4-BE49-F238E27FC236}">
+                <a16:creationId xmlns:a16="http://schemas.microsoft.com/office/drawing/2014/main" id="{A48F3F0A-DD67-2A6E-99E2-36E05BCD8A85}"/>
+              </a:ext>
+            </a:extLst>
+          </p:cNvPr>
+          <p:cNvSpPr>
+            <a:spLocks noGrp="1"/>
+          </p:cNvSpPr>
+          <p:nvPr>
+            <p:ph type="ctrTitle"/>
+          </p:nvPr>
+        </p:nvSpPr>
+        <p:spPr>
+          <a:xfrm>
+            <a:off x="1491521" y="381188"/>
+            <a:ext cx="3182079" cy="677312"/>
+          </a:xfrm>
+        </p:spPr>
+        <p:txBody>
+          <a:bodyPr>
+            <a:noAutofit/>
+          </a:bodyPr>
+          <a:lstStyle/>
+          <a:p>
+            <a:r>
+              <a:rPr lang="en-US" sz="4400" dirty="0">
+                <a:solidFill>
+                  <a:srgbClr val="EEEEEE"/>
+                </a:solidFill>
+                <a:latin typeface="Cascadia Code SemiBold" panose="020B0609020000020004" pitchFamily="49" charset="0"/>
+                <a:ea typeface="Cascadia Code SemiBold" panose="020B0609020000020004" pitchFamily="49" charset="0"/>
+                <a:cs typeface="Cascadia Code SemiBold" panose="020B0609020000020004" pitchFamily="49" charset="0"/>
+              </a:rPr>
+              <a:t>Prototype</a:t>
+            </a:r>
+            <a:endParaRPr lang="en-IN" sz="4400" dirty="0">
+              <a:solidFill>
+                <a:srgbClr val="EEEEEE"/>
+              </a:solidFill>
+              <a:latin typeface="Cascadia Code SemiBold" panose="020B0609020000020004" pitchFamily="49" charset="0"/>
+              <a:ea typeface="Cascadia Code SemiBold" panose="020B0609020000020004" pitchFamily="49" charset="0"/>
+              <a:cs typeface="Cascadia Code SemiBold" panose="020B0609020000020004" pitchFamily="49" charset="0"/>
+            </a:endParaRPr>
+          </a:p>
+        </p:txBody>
+      </p:sp>
+      <p:sp>
+        <p:nvSpPr>
+          <p:cNvPr id="3" name="Subtitle 2">
+            <a:extLst>
+              <a:ext uri="{FF2B5EF4-FFF2-40B4-BE49-F238E27FC236}">
+                <a16:creationId xmlns:a16="http://schemas.microsoft.com/office/drawing/2014/main" id="{D006C8C8-3712-034B-F68E-BF266CFED071}"/>
+              </a:ext>
+            </a:extLst>
+          </p:cNvPr>
+          <p:cNvSpPr>
+            <a:spLocks noGrp="1"/>
+          </p:cNvSpPr>
+          <p:nvPr>
+            <p:ph type="subTitle" idx="1"/>
+          </p:nvPr>
+        </p:nvSpPr>
+        <p:spPr>
+          <a:xfrm>
+            <a:off x="509228" y="1363482"/>
+            <a:ext cx="11070674" cy="5113330"/>
+          </a:xfrm>
+        </p:spPr>
+        <p:txBody>
+          <a:bodyPr>
+            <a:normAutofit/>
+          </a:bodyPr>
+          <a:lstStyle/>
+          <a:p>
+            <a:r>
+              <a:rPr lang="en-US" dirty="0">
+                <a:solidFill>
+                  <a:srgbClr val="EEEEEE"/>
+                </a:solidFill>
+                <a:latin typeface="Cascadia Code" panose="020B0609020000020004" pitchFamily="49" charset="0"/>
+                <a:ea typeface="Cascadia Code" panose="020B0609020000020004" pitchFamily="49" charset="0"/>
+                <a:cs typeface="Cascadia Code" panose="020B0609020000020004" pitchFamily="49" charset="0"/>
+              </a:rPr>
+              <a:t>GreenVolt as a simple yet so elegant design.</a:t>
+            </a:r>
+            <a:endParaRPr lang="en-IN" dirty="0">
+              <a:solidFill>
+                <a:srgbClr val="EEEEEE"/>
+              </a:solidFill>
+              <a:latin typeface="Cascadia Code" panose="020B0609020000020004" pitchFamily="49" charset="0"/>
+              <a:ea typeface="Cascadia Code" panose="020B0609020000020004" pitchFamily="49" charset="0"/>
+              <a:cs typeface="Cascadia Code" panose="020B0609020000020004" pitchFamily="49" charset="0"/>
+            </a:endParaRPr>
+          </a:p>
+        </p:txBody>
+      </p:sp>
+      <p:pic>
+        <p:nvPicPr>
+          <p:cNvPr id="5" name="Graphic 4">
+            <a:extLst>
+              <a:ext uri="{FF2B5EF4-FFF2-40B4-BE49-F238E27FC236}">
+                <a16:creationId xmlns:a16="http://schemas.microsoft.com/office/drawing/2014/main" id="{A4BCB70E-E00F-89BB-D7AB-2C0D654A7F8C}"/>
+              </a:ext>
+            </a:extLst>
+          </p:cNvPr>
+          <p:cNvPicPr>
+            <a:picLocks noChangeAspect="1"/>
+          </p:cNvPicPr>
+          <p:nvPr/>
+        </p:nvPicPr>
+        <p:blipFill>
+          <a:blip r:embed="rId3">
+            <a:extLst>
+              <a:ext uri="{28A0092B-C50C-407E-A947-70E740481C1C}">
+                <a14:useLocalDpi xmlns:a14="http://schemas.microsoft.com/office/drawing/2010/main" val="0"/>
+              </a:ext>
+              <a:ext uri="{96DAC541-7B7A-43D3-8B79-37D633B846F1}">
+                <asvg:svgBlip xmlns:asvg="http://schemas.microsoft.com/office/drawing/2016/SVG/main" r:embed="rId4"/>
+              </a:ext>
+            </a:extLst>
+          </a:blip>
+          <a:stretch>
+            <a:fillRect/>
+          </a:stretch>
+        </p:blipFill>
+        <p:spPr>
+          <a:xfrm>
+            <a:off x="509228" y="228697"/>
+            <a:ext cx="982294" cy="982294"/>
+          </a:xfrm>
+          <a:prstGeom prst="rect">
+            <a:avLst/>
+          </a:prstGeom>
+        </p:spPr>
+      </p:pic>
+      <p:pic>
+        <p:nvPicPr>
+          <p:cNvPr id="7" name="Picture 6">
+            <a:extLst>
+              <a:ext uri="{FF2B5EF4-FFF2-40B4-BE49-F238E27FC236}">
+                <a16:creationId xmlns:a16="http://schemas.microsoft.com/office/drawing/2014/main" id="{5A47DAC9-973A-A46C-AA4B-ED08A679CC19}"/>
+              </a:ext>
+            </a:extLst>
+          </p:cNvPr>
+          <p:cNvPicPr>
+            <a:picLocks noChangeAspect="1"/>
+          </p:cNvPicPr>
+          <p:nvPr/>
+        </p:nvPicPr>
+        <p:blipFill>
+          <a:blip r:embed="rId5"/>
+          <a:stretch>
+            <a:fillRect/>
+          </a:stretch>
+        </p:blipFill>
+        <p:spPr>
+          <a:xfrm>
+            <a:off x="1593554" y="2038276"/>
+            <a:ext cx="8902022" cy="4317080"/>
+          </a:xfrm>
+          <a:prstGeom prst="snip2DiagRect">
+            <a:avLst/>
+          </a:prstGeom>
+          <a:solidFill>
+            <a:srgbClr val="FFFFFF">
+              <a:shade val="85000"/>
+            </a:srgbClr>
+          </a:solidFill>
+          <a:ln w="88900" cap="sq">
+            <a:solidFill>
+              <a:srgbClr val="FFFFFF"/>
+            </a:solidFill>
+            <a:miter lim="800000"/>
+          </a:ln>
+          <a:effectLst>
+            <a:outerShdw blurRad="88900" algn="tl" rotWithShape="0">
+              <a:srgbClr val="000000">
+                <a:alpha val="45000"/>
+              </a:srgbClr>
+            </a:outerShdw>
+          </a:effectLst>
+          <a:scene3d>
+            <a:camera prst="orthographicFront"/>
+            <a:lightRig rig="twoPt" dir="t">
+              <a:rot lat="0" lon="0" rev="7200000"/>
+            </a:lightRig>
+          </a:scene3d>
+          <a:sp3d>
+            <a:bevelT w="25400" h="19050"/>
+            <a:contourClr>
+              <a:srgbClr val="FFFFFF"/>
+            </a:contourClr>
+          </a:sp3d>
+        </p:spPr>
+      </p:pic>
+    </p:spTree>
+    <p:extLst>
+      <p:ext uri="{BB962C8B-B14F-4D97-AF65-F5344CB8AC3E}">
+        <p14:creationId xmlns:p14="http://schemas.microsoft.com/office/powerpoint/2010/main" val="3701070464"/>
+      </p:ext>
+    </p:extLst>
+  </p:cSld>
+  <p:clrMapOvr>
+    <a:masterClrMapping/>
+  </p:clrMapOvr>
+</p:sld>
+</file>
+
+<file path=ppt/slides/slide8.xml><?xml version="1.0" encoding="utf-8"?>
+<p:sld xmlns:a="http://schemas.openxmlformats.org/drawingml/2006/main" xmlns:r="http://schemas.openxmlformats.org/officeDocument/2006/relationships" xmlns:p="http://schemas.openxmlformats.org/presentationml/2006/main">
+  <p:cSld>
+    <p:bg>
+      <p:bgPr>
+        <a:solidFill>
+          <a:srgbClr val="212121"/>
+        </a:solidFill>
+        <a:effectLst/>
+      </p:bgPr>
+    </p:bg>
+    <p:spTree>
+      <p:nvGrpSpPr>
+        <p:cNvPr id="1" name=""/>
+        <p:cNvGrpSpPr/>
+        <p:nvPr/>
+      </p:nvGrpSpPr>
+      <p:grpSpPr>
+        <a:xfrm>
+          <a:off x="0" y="0"/>
+          <a:ext cx="0" cy="0"/>
+          <a:chOff x="0" y="0"/>
+          <a:chExt cx="0" cy="0"/>
+        </a:xfrm>
+      </p:grpSpPr>
+      <p:sp>
+        <p:nvSpPr>
+          <p:cNvPr id="2" name="Title 1">
+            <a:extLst>
+              <a:ext uri="{FF2B5EF4-FFF2-40B4-BE49-F238E27FC236}">
+                <a16:creationId xmlns:a16="http://schemas.microsoft.com/office/drawing/2014/main" id="{A48F3F0A-DD67-2A6E-99E2-36E05BCD8A85}"/>
+              </a:ext>
+            </a:extLst>
+          </p:cNvPr>
+          <p:cNvSpPr>
+            <a:spLocks noGrp="1"/>
+          </p:cNvSpPr>
+          <p:nvPr>
+            <p:ph type="ctrTitle"/>
+          </p:nvPr>
+        </p:nvSpPr>
+        <p:spPr>
+          <a:xfrm>
+            <a:off x="1491521" y="381188"/>
+            <a:ext cx="3182079" cy="677312"/>
+          </a:xfrm>
+        </p:spPr>
+        <p:txBody>
+          <a:bodyPr>
+            <a:noAutofit/>
+          </a:bodyPr>
+          <a:lstStyle/>
+          <a:p>
+            <a:r>
+              <a:rPr lang="en-US" sz="4400" dirty="0">
+                <a:solidFill>
+                  <a:srgbClr val="EEEEEE"/>
+                </a:solidFill>
+                <a:latin typeface="Cascadia Code SemiBold" panose="020B0609020000020004" pitchFamily="49" charset="0"/>
+                <a:ea typeface="Cascadia Code SemiBold" panose="020B0609020000020004" pitchFamily="49" charset="0"/>
+                <a:cs typeface="Cascadia Code SemiBold" panose="020B0609020000020004" pitchFamily="49" charset="0"/>
+              </a:rPr>
+              <a:t>Prototype</a:t>
+            </a:r>
+            <a:endParaRPr lang="en-IN" sz="4400" dirty="0">
+              <a:solidFill>
+                <a:srgbClr val="EEEEEE"/>
+              </a:solidFill>
+              <a:latin typeface="Cascadia Code SemiBold" panose="020B0609020000020004" pitchFamily="49" charset="0"/>
+              <a:ea typeface="Cascadia Code SemiBold" panose="020B0609020000020004" pitchFamily="49" charset="0"/>
+              <a:cs typeface="Cascadia Code SemiBold" panose="020B0609020000020004" pitchFamily="49" charset="0"/>
+            </a:endParaRPr>
+          </a:p>
+        </p:txBody>
+      </p:sp>
+      <p:sp>
+        <p:nvSpPr>
+          <p:cNvPr id="3" name="Subtitle 2">
+            <a:extLst>
+              <a:ext uri="{FF2B5EF4-FFF2-40B4-BE49-F238E27FC236}">
+                <a16:creationId xmlns:a16="http://schemas.microsoft.com/office/drawing/2014/main" id="{D006C8C8-3712-034B-F68E-BF266CFED071}"/>
+              </a:ext>
+            </a:extLst>
+          </p:cNvPr>
+          <p:cNvSpPr>
+            <a:spLocks noGrp="1"/>
+          </p:cNvSpPr>
+          <p:nvPr>
+            <p:ph type="subTitle" idx="1"/>
+          </p:nvPr>
+        </p:nvSpPr>
+        <p:spPr>
+          <a:xfrm>
+            <a:off x="3943786" y="1363482"/>
+            <a:ext cx="7391982" cy="5113330"/>
+          </a:xfrm>
+        </p:spPr>
+        <p:txBody>
+          <a:bodyPr>
+            <a:normAutofit/>
+          </a:bodyPr>
+          <a:lstStyle/>
+          <a:p>
+            <a:r>
+              <a:rPr lang="en-US" sz="3600" dirty="0">
+                <a:solidFill>
+                  <a:srgbClr val="EEEEEE"/>
+                </a:solidFill>
+                <a:latin typeface="Cascadia Code" panose="020B0609020000020004" pitchFamily="49" charset="0"/>
+                <a:ea typeface="Cascadia Code" panose="020B0609020000020004" pitchFamily="49" charset="0"/>
+                <a:cs typeface="Cascadia Code" panose="020B0609020000020004" pitchFamily="49" charset="0"/>
+              </a:rPr>
+              <a:t>User experience comes first and mobile responsiveness is a must.</a:t>
+            </a:r>
+          </a:p>
+          <a:p>
+            <a:endParaRPr lang="en-US" sz="3600" dirty="0">
+              <a:solidFill>
+                <a:srgbClr val="EEEEEE"/>
+              </a:solidFill>
+              <a:latin typeface="Cascadia Code" panose="020B0609020000020004" pitchFamily="49" charset="0"/>
+              <a:ea typeface="Cascadia Code" panose="020B0609020000020004" pitchFamily="49" charset="0"/>
+              <a:cs typeface="Cascadia Code" panose="020B0609020000020004" pitchFamily="49" charset="0"/>
+            </a:endParaRPr>
+          </a:p>
+          <a:p>
+            <a:r>
+              <a:rPr lang="en-US" sz="3600" dirty="0">
+                <a:solidFill>
+                  <a:srgbClr val="EEEEEE"/>
+                </a:solidFill>
+                <a:latin typeface="Cascadia Code" panose="020B0609020000020004" pitchFamily="49" charset="0"/>
+                <a:ea typeface="Cascadia Code" panose="020B0609020000020004" pitchFamily="49" charset="0"/>
+                <a:cs typeface="Cascadia Code" panose="020B0609020000020004" pitchFamily="49" charset="0"/>
+              </a:rPr>
+              <a:t>GreenVolt is a website where every single page is optimized of all Morden phones and tablets.</a:t>
+            </a:r>
+          </a:p>
+        </p:txBody>
+      </p:sp>
+      <p:pic>
+        <p:nvPicPr>
+          <p:cNvPr id="5" name="Graphic 4">
+            <a:extLst>
+              <a:ext uri="{FF2B5EF4-FFF2-40B4-BE49-F238E27FC236}">
+                <a16:creationId xmlns:a16="http://schemas.microsoft.com/office/drawing/2014/main" id="{A4BCB70E-E00F-89BB-D7AB-2C0D654A7F8C}"/>
+              </a:ext>
+            </a:extLst>
+          </p:cNvPr>
+          <p:cNvPicPr>
+            <a:picLocks noChangeAspect="1"/>
+          </p:cNvPicPr>
+          <p:nvPr/>
+        </p:nvPicPr>
+        <p:blipFill>
+          <a:blip r:embed="rId3">
+            <a:extLst>
+              <a:ext uri="{28A0092B-C50C-407E-A947-70E740481C1C}">
+                <a14:useLocalDpi xmlns:a14="http://schemas.microsoft.com/office/drawing/2010/main" val="0"/>
+              </a:ext>
+              <a:ext uri="{96DAC541-7B7A-43D3-8B79-37D633B846F1}">
+                <asvg:svgBlip xmlns:asvg="http://schemas.microsoft.com/office/drawing/2016/SVG/main" r:embed="rId4"/>
+              </a:ext>
+            </a:extLst>
+          </a:blip>
+          <a:stretch>
+            <a:fillRect/>
+          </a:stretch>
+        </p:blipFill>
+        <p:spPr>
+          <a:xfrm>
+            <a:off x="509228" y="228697"/>
+            <a:ext cx="982294" cy="982294"/>
+          </a:xfrm>
+          <a:prstGeom prst="rect">
+            <a:avLst/>
+          </a:prstGeom>
+        </p:spPr>
+      </p:pic>
+      <p:pic>
+        <p:nvPicPr>
+          <p:cNvPr id="6" name="Picture 5">
+            <a:extLst>
+              <a:ext uri="{FF2B5EF4-FFF2-40B4-BE49-F238E27FC236}">
+                <a16:creationId xmlns:a16="http://schemas.microsoft.com/office/drawing/2014/main" id="{D781E69F-0F48-AD3F-B491-105C614C713C}"/>
+              </a:ext>
+            </a:extLst>
+          </p:cNvPr>
+          <p:cNvPicPr>
+            <a:picLocks noChangeAspect="1"/>
+          </p:cNvPicPr>
+          <p:nvPr/>
+        </p:nvPicPr>
+        <p:blipFill>
+          <a:blip r:embed="rId5"/>
+          <a:stretch>
+            <a:fillRect/>
+          </a:stretch>
+        </p:blipFill>
+        <p:spPr>
+          <a:xfrm>
+            <a:off x="756069" y="1637254"/>
+            <a:ext cx="3038696" cy="3960420"/>
+          </a:xfrm>
+          <a:prstGeom prst="rect">
+            <a:avLst/>
+          </a:prstGeom>
+          <a:ln>
+            <a:solidFill>
+              <a:srgbClr val="EEEEEE"/>
+            </a:solidFill>
+          </a:ln>
+          <a:effectLst>
+            <a:reflection blurRad="12700" stA="30000" endPos="30000" dist="5000" dir="5400000" sy="-100000" algn="bl" rotWithShape="0"/>
+          </a:effectLst>
+          <a:scene3d>
+            <a:camera prst="perspectiveContrastingLeftFacing">
+              <a:rot lat="300000" lon="19800000" rev="0"/>
+            </a:camera>
+            <a:lightRig rig="threePt" dir="t">
+              <a:rot lat="0" lon="0" rev="2700000"/>
+            </a:lightRig>
+          </a:scene3d>
+          <a:sp3d>
+            <a:bevelT w="63500" h="50800"/>
+          </a:sp3d>
+        </p:spPr>
+      </p:pic>
+    </p:spTree>
+    <p:extLst>
+      <p:ext uri="{BB962C8B-B14F-4D97-AF65-F5344CB8AC3E}">
+        <p14:creationId xmlns:p14="http://schemas.microsoft.com/office/powerpoint/2010/main" val="3715802221"/>
+      </p:ext>
+    </p:extLst>
+  </p:cSld>
+  <p:clrMapOvr>
+    <a:masterClrMapping/>
+  </p:clrMapOvr>
+</p:sld>
+</file>
+
+<file path=ppt/slides/slide9.xml><?xml version="1.0" encoding="utf-8"?>
+<p:sld xmlns:a="http://schemas.openxmlformats.org/drawingml/2006/main" xmlns:r="http://schemas.openxmlformats.org/officeDocument/2006/relationships" xmlns:p="http://schemas.openxmlformats.org/presentationml/2006/main">
+  <p:cSld>
+    <p:bg>
+      <p:bgPr>
+        <a:solidFill>
+          <a:srgbClr val="212121"/>
+        </a:solidFill>
+        <a:effectLst/>
+      </p:bgPr>
+    </p:bg>
+    <p:spTree>
+      <p:nvGrpSpPr>
+        <p:cNvPr id="1" name=""/>
+        <p:cNvGrpSpPr/>
+        <p:nvPr/>
+      </p:nvGrpSpPr>
+      <p:grpSpPr>
+        <a:xfrm>
+          <a:off x="0" y="0"/>
+          <a:ext cx="0" cy="0"/>
+          <a:chOff x="0" y="0"/>
+          <a:chExt cx="0" cy="0"/>
+        </a:xfrm>
+      </p:grpSpPr>
+      <p:sp>
+        <p:nvSpPr>
+          <p:cNvPr id="2" name="Title 1">
+            <a:extLst>
+              <a:ext uri="{FF2B5EF4-FFF2-40B4-BE49-F238E27FC236}">
+                <a16:creationId xmlns:a16="http://schemas.microsoft.com/office/drawing/2014/main" id="{A48F3F0A-DD67-2A6E-99E2-36E05BCD8A85}"/>
+              </a:ext>
+            </a:extLst>
+          </p:cNvPr>
+          <p:cNvSpPr>
+            <a:spLocks noGrp="1"/>
+          </p:cNvSpPr>
+          <p:nvPr>
+            <p:ph type="ctrTitle"/>
+          </p:nvPr>
+        </p:nvSpPr>
+        <p:spPr>
+          <a:xfrm>
+            <a:off x="1491521" y="381188"/>
+            <a:ext cx="3182079" cy="677312"/>
+          </a:xfrm>
+        </p:spPr>
+        <p:txBody>
+          <a:bodyPr>
+            <a:noAutofit/>
+          </a:bodyPr>
+          <a:lstStyle/>
+          <a:p>
+            <a:r>
+              <a:rPr lang="en-US" sz="4400" dirty="0">
+                <a:solidFill>
+                  <a:srgbClr val="EEEEEE"/>
+                </a:solidFill>
+                <a:latin typeface="Cascadia Code SemiBold" panose="020B0609020000020004" pitchFamily="49" charset="0"/>
+                <a:ea typeface="Cascadia Code SemiBold" panose="020B0609020000020004" pitchFamily="49" charset="0"/>
+                <a:cs typeface="Cascadia Code SemiBold" panose="020B0609020000020004" pitchFamily="49" charset="0"/>
+              </a:rPr>
+              <a:t>Prototype</a:t>
+            </a:r>
+            <a:endParaRPr lang="en-IN" sz="4400" dirty="0">
+              <a:solidFill>
+                <a:srgbClr val="EEEEEE"/>
+              </a:solidFill>
+              <a:latin typeface="Cascadia Code SemiBold" panose="020B0609020000020004" pitchFamily="49" charset="0"/>
+              <a:ea typeface="Cascadia Code SemiBold" panose="020B0609020000020004" pitchFamily="49" charset="0"/>
+              <a:cs typeface="Cascadia Code SemiBold" panose="020B0609020000020004" pitchFamily="49" charset="0"/>
+            </a:endParaRPr>
+          </a:p>
+        </p:txBody>
+      </p:sp>
+      <p:sp>
+        <p:nvSpPr>
+          <p:cNvPr id="3" name="Subtitle 2">
+            <a:extLst>
+              <a:ext uri="{FF2B5EF4-FFF2-40B4-BE49-F238E27FC236}">
+                <a16:creationId xmlns:a16="http://schemas.microsoft.com/office/drawing/2014/main" id="{D006C8C8-3712-034B-F68E-BF266CFED071}"/>
+              </a:ext>
+            </a:extLst>
+          </p:cNvPr>
+          <p:cNvSpPr>
+            <a:spLocks noGrp="1"/>
+          </p:cNvSpPr>
+          <p:nvPr>
+            <p:ph type="subTitle" idx="1"/>
+          </p:nvPr>
+        </p:nvSpPr>
+        <p:spPr>
+          <a:xfrm>
+            <a:off x="509228" y="1363482"/>
+            <a:ext cx="11070674" cy="5113330"/>
+          </a:xfrm>
+        </p:spPr>
+        <p:txBody>
+          <a:bodyPr>
+            <a:normAutofit/>
+          </a:bodyPr>
+          <a:lstStyle/>
+          <a:p>
+            <a:r>
+              <a:rPr lang="en-US" sz="3600" dirty="0">
+                <a:solidFill>
+                  <a:srgbClr val="EEEEEE"/>
+                </a:solidFill>
+                <a:latin typeface="Cascadia Code" panose="020B0609020000020004" pitchFamily="49" charset="0"/>
+                <a:ea typeface="Cascadia Code" panose="020B0609020000020004" pitchFamily="49" charset="0"/>
+                <a:cs typeface="Cascadia Code" panose="020B0609020000020004" pitchFamily="49" charset="0"/>
+              </a:rPr>
+              <a:t>Marketplace GreenVolt ‘s heart and soul.</a:t>
+            </a:r>
+            <a:endParaRPr lang="en-IN" sz="3600" dirty="0">
+              <a:solidFill>
+                <a:srgbClr val="EEEEEE"/>
+              </a:solidFill>
+              <a:latin typeface="Cascadia Code" panose="020B0609020000020004" pitchFamily="49" charset="0"/>
+              <a:ea typeface="Cascadia Code" panose="020B0609020000020004" pitchFamily="49" charset="0"/>
+              <a:cs typeface="Cascadia Code" panose="020B0609020000020004" pitchFamily="49" charset="0"/>
+            </a:endParaRPr>
+          </a:p>
+        </p:txBody>
+      </p:sp>
+      <p:pic>
+        <p:nvPicPr>
+          <p:cNvPr id="5" name="Graphic 4">
+            <a:extLst>
+              <a:ext uri="{FF2B5EF4-FFF2-40B4-BE49-F238E27FC236}">
+                <a16:creationId xmlns:a16="http://schemas.microsoft.com/office/drawing/2014/main" id="{A4BCB70E-E00F-89BB-D7AB-2C0D654A7F8C}"/>
+              </a:ext>
+            </a:extLst>
+          </p:cNvPr>
+          <p:cNvPicPr>
+            <a:picLocks noChangeAspect="1"/>
+          </p:cNvPicPr>
+          <p:nvPr/>
+        </p:nvPicPr>
+        <p:blipFill>
+          <a:blip r:embed="rId3">
+            <a:extLst>
+              <a:ext uri="{28A0092B-C50C-407E-A947-70E740481C1C}">
+                <a14:useLocalDpi xmlns:a14="http://schemas.microsoft.com/office/drawing/2010/main" val="0"/>
+              </a:ext>
+              <a:ext uri="{96DAC541-7B7A-43D3-8B79-37D633B846F1}">
+                <asvg:svgBlip xmlns:asvg="http://schemas.microsoft.com/office/drawing/2016/SVG/main" r:embed="rId4"/>
+              </a:ext>
+            </a:extLst>
+          </a:blip>
+          <a:stretch>
+            <a:fillRect/>
+          </a:stretch>
+        </p:blipFill>
+        <p:spPr>
+          <a:xfrm>
+            <a:off x="509228" y="228697"/>
+            <a:ext cx="982294" cy="982294"/>
+          </a:xfrm>
+          <a:prstGeom prst="rect">
+            <a:avLst/>
+          </a:prstGeom>
+        </p:spPr>
+      </p:pic>
+      <p:pic>
+        <p:nvPicPr>
+          <p:cNvPr id="7" name="Picture 6">
+            <a:extLst>
+              <a:ext uri="{FF2B5EF4-FFF2-40B4-BE49-F238E27FC236}">
+                <a16:creationId xmlns:a16="http://schemas.microsoft.com/office/drawing/2014/main" id="{5A47DAC9-973A-A46C-AA4B-ED08A679CC19}"/>
+              </a:ext>
+            </a:extLst>
+          </p:cNvPr>
+          <p:cNvPicPr>
+            <a:picLocks noChangeAspect="1"/>
+          </p:cNvPicPr>
+          <p:nvPr/>
+        </p:nvPicPr>
+        <p:blipFill>
+          <a:blip r:embed="rId5">
+            <a:extLst>
+              <a:ext uri="{28A0092B-C50C-407E-A947-70E740481C1C}">
+                <a14:useLocalDpi xmlns:a14="http://schemas.microsoft.com/office/drawing/2010/main" val="0"/>
+              </a:ext>
+            </a:extLst>
+          </a:blip>
+          <a:srcRect l="322" r="322"/>
+          <a:stretch/>
+        </p:blipFill>
+        <p:spPr>
+          <a:xfrm>
+            <a:off x="1593554" y="2038276"/>
+            <a:ext cx="8902022" cy="4317080"/>
+          </a:xfrm>
+          <a:prstGeom prst="snip2DiagRect">
+            <a:avLst/>
+          </a:prstGeom>
+          <a:solidFill>
+            <a:srgbClr val="FFFFFF">
+              <a:shade val="85000"/>
+            </a:srgbClr>
+          </a:solidFill>
+          <a:ln w="88900" cap="sq">
+            <a:solidFill>
+              <a:srgbClr val="FFFFFF"/>
+            </a:solidFill>
+            <a:miter lim="800000"/>
+          </a:ln>
+          <a:effectLst>
+            <a:outerShdw blurRad="88900" algn="tl" rotWithShape="0">
+              <a:srgbClr val="000000">
+                <a:alpha val="45000"/>
+              </a:srgbClr>
+            </a:outerShdw>
+          </a:effectLst>
+          <a:scene3d>
+            <a:camera prst="orthographicFront"/>
+            <a:lightRig rig="twoPt" dir="t">
+              <a:rot lat="0" lon="0" rev="7200000"/>
+            </a:lightRig>
+          </a:scene3d>
+          <a:sp3d>
+            <a:bevelT w="25400" h="19050"/>
+            <a:contourClr>
+              <a:srgbClr val="FFFFFF"/>
+            </a:contourClr>
+          </a:sp3d>
+        </p:spPr>
+      </p:pic>
+    </p:spTree>
+    <p:extLst>
+      <p:ext uri="{BB962C8B-B14F-4D97-AF65-F5344CB8AC3E}">
+        <p14:creationId xmlns:p14="http://schemas.microsoft.com/office/powerpoint/2010/main" val="1527150321"/>
       </p:ext>
     </p:extLst>
   </p:cSld>
@@ -3698,4 +7223,299 @@
     </a:ext>
   </a:extLst>
 </a:theme>
+</file>
+
+<file path=ppt/theme/theme2.xml><?xml version="1.0" encoding="utf-8"?>
+<a:theme xmlns:a="http://schemas.openxmlformats.org/drawingml/2006/main" name="Office Theme">
+  <a:themeElements>
+    <a:clrScheme name="Office">
+      <a:dk1>
+        <a:sysClr val="windowText" lastClr="000000"/>
+      </a:dk1>
+      <a:lt1>
+        <a:sysClr val="window" lastClr="FFFFFF"/>
+      </a:lt1>
+      <a:dk2>
+        <a:srgbClr val="44546A"/>
+      </a:dk2>
+      <a:lt2>
+        <a:srgbClr val="E7E6E6"/>
+      </a:lt2>
+      <a:accent1>
+        <a:srgbClr val="4472C4"/>
+      </a:accent1>
+      <a:accent2>
+        <a:srgbClr val="ED7D31"/>
+      </a:accent2>
+      <a:accent3>
+        <a:srgbClr val="A5A5A5"/>
+      </a:accent3>
+      <a:accent4>
+        <a:srgbClr val="FFC000"/>
+      </a:accent4>
+      <a:accent5>
+        <a:srgbClr val="5B9BD5"/>
+      </a:accent5>
+      <a:accent6>
+        <a:srgbClr val="70AD47"/>
+      </a:accent6>
+      <a:hlink>
+        <a:srgbClr val="0563C1"/>
+      </a:hlink>
+      <a:folHlink>
+        <a:srgbClr val="954F72"/>
+      </a:folHlink>
+    </a:clrScheme>
+    <a:fontScheme name="Office">
+      <a:majorFont>
+        <a:latin typeface="Calibri Light" panose="020F0302020204030204"/>
+        <a:ea typeface=""/>
+        <a:cs typeface=""/>
+        <a:font script="Jpan" typeface="游ゴシック Light"/>
+        <a:font script="Hang" typeface="맑은 고딕"/>
+        <a:font script="Hans" typeface="等线 Light"/>
+        <a:font script="Hant" typeface="新細明體"/>
+        <a:font script="Arab" typeface="Times New Roman"/>
+        <a:font script="Hebr" typeface="Times New Roman"/>
+        <a:font script="Thai" typeface="Angsana New"/>
+        <a:font script="Ethi" typeface="Nyala"/>
+        <a:font script="Beng" typeface="Vrinda"/>
+        <a:font script="Gujr" typeface="Shruti"/>
+        <a:font script="Khmr" typeface="MoolBoran"/>
+        <a:font script="Knda" typeface="Tunga"/>
+        <a:font script="Guru" typeface="Raavi"/>
+        <a:font script="Cans" typeface="Euphemia"/>
+        <a:font script="Cher" typeface="Plantagenet Cherokee"/>
+        <a:font script="Yiii" typeface="Microsoft Yi Baiti"/>
+        <a:font script="Tibt" typeface="Microsoft Himalaya"/>
+        <a:font script="Thaa" typeface="MV Boli"/>
+        <a:font script="Deva" typeface="Mangal"/>
+        <a:font script="Telu" typeface="Gautami"/>
+        <a:font script="Taml" typeface="Latha"/>
+        <a:font script="Syrc" typeface="Estrangelo Edessa"/>
+        <a:font script="Orya" typeface="Kalinga"/>
+        <a:font script="Mlym" typeface="Kartika"/>
+        <a:font script="Laoo" typeface="DokChampa"/>
+        <a:font script="Sinh" typeface="Iskoola Pota"/>
+        <a:font script="Mong" typeface="Mongolian Baiti"/>
+        <a:font script="Viet" typeface="Times New Roman"/>
+        <a:font script="Uigh" typeface="Microsoft Uighur"/>
+        <a:font script="Geor" typeface="Sylfaen"/>
+        <a:font script="Armn" typeface="Arial"/>
+        <a:font script="Bugi" typeface="Leelawadee UI"/>
+        <a:font script="Bopo" typeface="Microsoft JhengHei"/>
+        <a:font script="Java" typeface="Javanese Text"/>
+        <a:font script="Lisu" typeface="Segoe UI"/>
+        <a:font script="Mymr" typeface="Myanmar Text"/>
+        <a:font script="Nkoo" typeface="Ebrima"/>
+        <a:font script="Olck" typeface="Nirmala UI"/>
+        <a:font script="Osma" typeface="Ebrima"/>
+        <a:font script="Phag" typeface="Phagspa"/>
+        <a:font script="Syrn" typeface="Estrangelo Edessa"/>
+        <a:font script="Syrj" typeface="Estrangelo Edessa"/>
+        <a:font script="Syre" typeface="Estrangelo Edessa"/>
+        <a:font script="Sora" typeface="Nirmala UI"/>
+        <a:font script="Tale" typeface="Microsoft Tai Le"/>
+        <a:font script="Talu" typeface="Microsoft New Tai Lue"/>
+        <a:font script="Tfng" typeface="Ebrima"/>
+      </a:majorFont>
+      <a:minorFont>
+        <a:latin typeface="Calibri" panose="020F0502020204030204"/>
+        <a:ea typeface=""/>
+        <a:cs typeface=""/>
+        <a:font script="Jpan" typeface="游ゴシック"/>
+        <a:font script="Hang" typeface="맑은 고딕"/>
+        <a:font script="Hans" typeface="等线"/>
+        <a:font script="Hant" typeface="新細明體"/>
+        <a:font script="Arab" typeface="Arial"/>
+        <a:font script="Hebr" typeface="Arial"/>
+        <a:font script="Thai" typeface="Cordia New"/>
+        <a:font script="Ethi" typeface="Nyala"/>
+        <a:font script="Beng" typeface="Vrinda"/>
+        <a:font script="Gujr" typeface="Shruti"/>
+        <a:font script="Khmr" typeface="DaunPenh"/>
+        <a:font script="Knda" typeface="Tunga"/>
+        <a:font script="Guru" typeface="Raavi"/>
+        <a:font script="Cans" typeface="Euphemia"/>
+        <a:font script="Cher" typeface="Plantagenet Cherokee"/>
+        <a:font script="Yiii" typeface="Microsoft Yi Baiti"/>
+        <a:font script="Tibt" typeface="Microsoft Himalaya"/>
+        <a:font script="Thaa" typeface="MV Boli"/>
+        <a:font script="Deva" typeface="Mangal"/>
+        <a:font script="Telu" typeface="Gautami"/>
+        <a:font script="Taml" typeface="Latha"/>
+        <a:font script="Syrc" typeface="Estrangelo Edessa"/>
+        <a:font script="Orya" typeface="Kalinga"/>
+        <a:font script="Mlym" typeface="Kartika"/>
+        <a:font script="Laoo" typeface="DokChampa"/>
+        <a:font script="Sinh" typeface="Iskoola Pota"/>
+        <a:font script="Mong" typeface="Mongolian Baiti"/>
+        <a:font script="Viet" typeface="Arial"/>
+        <a:font script="Uigh" typeface="Microsoft Uighur"/>
+        <a:font script="Geor" typeface="Sylfaen"/>
+        <a:font script="Armn" typeface="Arial"/>
+        <a:font script="Bugi" typeface="Leelawadee UI"/>
+        <a:font script="Bopo" typeface="Microsoft JhengHei"/>
+        <a:font script="Java" typeface="Javanese Text"/>
+        <a:font script="Lisu" typeface="Segoe UI"/>
+        <a:font script="Mymr" typeface="Myanmar Text"/>
+        <a:font script="Nkoo" typeface="Ebrima"/>
+        <a:font script="Olck" typeface="Nirmala UI"/>
+        <a:font script="Osma" typeface="Ebrima"/>
+        <a:font script="Phag" typeface="Phagspa"/>
+        <a:font script="Syrn" typeface="Estrangelo Edessa"/>
+        <a:font script="Syrj" typeface="Estrangelo Edessa"/>
+        <a:font script="Syre" typeface="Estrangelo Edessa"/>
+        <a:font script="Sora" typeface="Nirmala UI"/>
+        <a:font script="Tale" typeface="Microsoft Tai Le"/>
+        <a:font script="Talu" typeface="Microsoft New Tai Lue"/>
+        <a:font script="Tfng" typeface="Ebrima"/>
+      </a:minorFont>
+    </a:fontScheme>
+    <a:fmtScheme name="Office">
+      <a:fillStyleLst>
+        <a:solidFill>
+          <a:schemeClr val="phClr"/>
+        </a:solidFill>
+        <a:gradFill rotWithShape="1">
+          <a:gsLst>
+            <a:gs pos="0">
+              <a:schemeClr val="phClr">
+                <a:lumMod val="110000"/>
+                <a:satMod val="105000"/>
+                <a:tint val="67000"/>
+              </a:schemeClr>
+            </a:gs>
+            <a:gs pos="50000">
+              <a:schemeClr val="phClr">
+                <a:lumMod val="105000"/>
+                <a:satMod val="103000"/>
+                <a:tint val="73000"/>
+              </a:schemeClr>
+            </a:gs>
+            <a:gs pos="100000">
+              <a:schemeClr val="phClr">
+                <a:lumMod val="105000"/>
+                <a:satMod val="109000"/>
+                <a:tint val="81000"/>
+              </a:schemeClr>
+            </a:gs>
+          </a:gsLst>
+          <a:lin ang="5400000" scaled="0"/>
+        </a:gradFill>
+        <a:gradFill rotWithShape="1">
+          <a:gsLst>
+            <a:gs pos="0">
+              <a:schemeClr val="phClr">
+                <a:satMod val="103000"/>
+                <a:lumMod val="102000"/>
+                <a:tint val="94000"/>
+              </a:schemeClr>
+            </a:gs>
+            <a:gs pos="50000">
+              <a:schemeClr val="phClr">
+                <a:satMod val="110000"/>
+                <a:lumMod val="100000"/>
+                <a:shade val="100000"/>
+              </a:schemeClr>
+            </a:gs>
+            <a:gs pos="100000">
+              <a:schemeClr val="phClr">
+                <a:lumMod val="99000"/>
+                <a:satMod val="120000"/>
+                <a:shade val="78000"/>
+              </a:schemeClr>
+            </a:gs>
+          </a:gsLst>
+          <a:lin ang="5400000" scaled="0"/>
+        </a:gradFill>
+      </a:fillStyleLst>
+      <a:lnStyleLst>
+        <a:ln w="6350" cap="flat" cmpd="sng" algn="ctr">
+          <a:solidFill>
+            <a:schemeClr val="phClr"/>
+          </a:solidFill>
+          <a:prstDash val="solid"/>
+          <a:miter lim="800000"/>
+        </a:ln>
+        <a:ln w="12700" cap="flat" cmpd="sng" algn="ctr">
+          <a:solidFill>
+            <a:schemeClr val="phClr"/>
+          </a:solidFill>
+          <a:prstDash val="solid"/>
+          <a:miter lim="800000"/>
+        </a:ln>
+        <a:ln w="19050" cap="flat" cmpd="sng" algn="ctr">
+          <a:solidFill>
+            <a:schemeClr val="phClr"/>
+          </a:solidFill>
+          <a:prstDash val="solid"/>
+          <a:miter lim="800000"/>
+        </a:ln>
+      </a:lnStyleLst>
+      <a:effectStyleLst>
+        <a:effectStyle>
+          <a:effectLst/>
+        </a:effectStyle>
+        <a:effectStyle>
+          <a:effectLst/>
+        </a:effectStyle>
+        <a:effectStyle>
+          <a:effectLst>
+            <a:outerShdw blurRad="57150" dist="19050" dir="5400000" algn="ctr" rotWithShape="0">
+              <a:srgbClr val="000000">
+                <a:alpha val="63000"/>
+              </a:srgbClr>
+            </a:outerShdw>
+          </a:effectLst>
+        </a:effectStyle>
+      </a:effectStyleLst>
+      <a:bgFillStyleLst>
+        <a:solidFill>
+          <a:schemeClr val="phClr"/>
+        </a:solidFill>
+        <a:solidFill>
+          <a:schemeClr val="phClr">
+            <a:tint val="95000"/>
+            <a:satMod val="170000"/>
+          </a:schemeClr>
+        </a:solidFill>
+        <a:gradFill rotWithShape="1">
+          <a:gsLst>
+            <a:gs pos="0">
+              <a:schemeClr val="phClr">
+                <a:tint val="93000"/>
+                <a:satMod val="150000"/>
+                <a:shade val="98000"/>
+                <a:lumMod val="102000"/>
+              </a:schemeClr>
+            </a:gs>
+            <a:gs pos="50000">
+              <a:schemeClr val="phClr">
+                <a:tint val="98000"/>
+                <a:satMod val="130000"/>
+                <a:shade val="90000"/>
+                <a:lumMod val="103000"/>
+              </a:schemeClr>
+            </a:gs>
+            <a:gs pos="100000">
+              <a:schemeClr val="phClr">
+                <a:shade val="63000"/>
+                <a:satMod val="120000"/>
+              </a:schemeClr>
+            </a:gs>
+          </a:gsLst>
+          <a:lin ang="5400000" scaled="0"/>
+        </a:gradFill>
+      </a:bgFillStyleLst>
+    </a:fmtScheme>
+  </a:themeElements>
+  <a:objectDefaults/>
+  <a:extraClrSchemeLst/>
+  <a:extLst>
+    <a:ext uri="{05A4C25C-085E-4340-85A3-A5531E510DB2}">
+      <thm15:themeFamily xmlns:thm15="http://schemas.microsoft.com/office/thememl/2012/main" name="Office Theme" id="{62F939B6-93AF-4DB8-9C6B-D6C7DFDC589F}" vid="{4A3C46E8-61CC-4603-A589-7422A47A8E4A}"/>
+    </a:ext>
+  </a:extLst>
+</a:theme>
 </file>
</xml_diff>